<commit_message>
Added babel logo to presentation
</commit_message>
<xml_diff>
--- a/presentation.pptx
+++ b/presentation.pptx
@@ -16421,6 +16421,43 @@
           </a:p>
         </p:txBody>
       </p:sp>
+      <p:pic>
+        <p:nvPicPr>
+          <p:cNvPr id="4" name="Picture 13">
+            <a:extLst>
+              <a:ext uri="{FF2B5EF4-FFF2-40B4-BE49-F238E27FC236}">
+                <a16:creationId xmlns:a16="http://schemas.microsoft.com/office/drawing/2014/main" id="{1B006B35-5217-4D71-A17F-1882EF834330}"/>
+              </a:ext>
+            </a:extLst>
+          </p:cNvPr>
+          <p:cNvPicPr>
+            <a:picLocks noChangeAspect="1"/>
+          </p:cNvPicPr>
+          <p:nvPr/>
+        </p:nvPicPr>
+        <p:blipFill>
+          <a:blip r:embed="rId2">
+            <a:extLst>
+              <a:ext uri="{28A0092B-C50C-407E-A947-70E740481C1C}">
+                <a14:useLocalDpi xmlns:a14="http://schemas.microsoft.com/office/drawing/2010/main" val="0"/>
+              </a:ext>
+            </a:extLst>
+          </a:blip>
+          <a:stretch>
+            <a:fillRect/>
+          </a:stretch>
+        </p:blipFill>
+        <p:spPr>
+          <a:xfrm>
+            <a:off x="130315" y="4638674"/>
+            <a:ext cx="1488935" cy="374933"/>
+          </a:xfrm>
+          <a:prstGeom prst="rect">
+            <a:avLst/>
+          </a:prstGeom>
+          <a:effectLst/>
+        </p:spPr>
+      </p:pic>
     </p:spTree>
     <p:extLst>
       <p:ext uri="{BB962C8B-B14F-4D97-AF65-F5344CB8AC3E}">
@@ -16533,6 +16570,43 @@
           <a:prstGeom prst="rect">
             <a:avLst/>
           </a:prstGeom>
+        </p:spPr>
+      </p:pic>
+      <p:pic>
+        <p:nvPicPr>
+          <p:cNvPr id="5" name="Picture 13">
+            <a:extLst>
+              <a:ext uri="{FF2B5EF4-FFF2-40B4-BE49-F238E27FC236}">
+                <a16:creationId xmlns:a16="http://schemas.microsoft.com/office/drawing/2014/main" id="{B69B8DE4-1197-4E61-90EC-F5D622280608}"/>
+              </a:ext>
+            </a:extLst>
+          </p:cNvPr>
+          <p:cNvPicPr>
+            <a:picLocks noChangeAspect="1"/>
+          </p:cNvPicPr>
+          <p:nvPr/>
+        </p:nvPicPr>
+        <p:blipFill>
+          <a:blip r:embed="rId3">
+            <a:extLst>
+              <a:ext uri="{28A0092B-C50C-407E-A947-70E740481C1C}">
+                <a14:useLocalDpi xmlns:a14="http://schemas.microsoft.com/office/drawing/2010/main" val="0"/>
+              </a:ext>
+            </a:extLst>
+          </a:blip>
+          <a:stretch>
+            <a:fillRect/>
+          </a:stretch>
+        </p:blipFill>
+        <p:spPr>
+          <a:xfrm>
+            <a:off x="130315" y="4638674"/>
+            <a:ext cx="1488935" cy="374933"/>
+          </a:xfrm>
+          <a:prstGeom prst="rect">
+            <a:avLst/>
+          </a:prstGeom>
+          <a:effectLst/>
         </p:spPr>
       </p:pic>
     </p:spTree>
@@ -16632,6 +16706,43 @@
           </a:p>
         </p:txBody>
       </p:sp>
+      <p:pic>
+        <p:nvPicPr>
+          <p:cNvPr id="4" name="Picture 13">
+            <a:extLst>
+              <a:ext uri="{FF2B5EF4-FFF2-40B4-BE49-F238E27FC236}">
+                <a16:creationId xmlns:a16="http://schemas.microsoft.com/office/drawing/2014/main" id="{2AA72C6A-0570-4A37-A754-30D2F34D7A95}"/>
+              </a:ext>
+            </a:extLst>
+          </p:cNvPr>
+          <p:cNvPicPr>
+            <a:picLocks noChangeAspect="1"/>
+          </p:cNvPicPr>
+          <p:nvPr/>
+        </p:nvPicPr>
+        <p:blipFill>
+          <a:blip r:embed="rId2">
+            <a:extLst>
+              <a:ext uri="{28A0092B-C50C-407E-A947-70E740481C1C}">
+                <a14:useLocalDpi xmlns:a14="http://schemas.microsoft.com/office/drawing/2010/main" val="0"/>
+              </a:ext>
+            </a:extLst>
+          </a:blip>
+          <a:stretch>
+            <a:fillRect/>
+          </a:stretch>
+        </p:blipFill>
+        <p:spPr>
+          <a:xfrm>
+            <a:off x="130315" y="4638674"/>
+            <a:ext cx="1488935" cy="374933"/>
+          </a:xfrm>
+          <a:prstGeom prst="rect">
+            <a:avLst/>
+          </a:prstGeom>
+          <a:effectLst/>
+        </p:spPr>
+      </p:pic>
     </p:spTree>
     <p:extLst>
       <p:ext uri="{BB962C8B-B14F-4D97-AF65-F5344CB8AC3E}">
@@ -16821,6 +16932,43 @@
           </a:p>
         </p:txBody>
       </p:sp>
+      <p:pic>
+        <p:nvPicPr>
+          <p:cNvPr id="7" name="Picture 13">
+            <a:extLst>
+              <a:ext uri="{FF2B5EF4-FFF2-40B4-BE49-F238E27FC236}">
+                <a16:creationId xmlns:a16="http://schemas.microsoft.com/office/drawing/2014/main" id="{A396D114-F713-4BC9-A3EC-16B72FCB275E}"/>
+              </a:ext>
+            </a:extLst>
+          </p:cNvPr>
+          <p:cNvPicPr>
+            <a:picLocks noChangeAspect="1"/>
+          </p:cNvPicPr>
+          <p:nvPr/>
+        </p:nvPicPr>
+        <p:blipFill>
+          <a:blip r:embed="rId2">
+            <a:extLst>
+              <a:ext uri="{28A0092B-C50C-407E-A947-70E740481C1C}">
+                <a14:useLocalDpi xmlns:a14="http://schemas.microsoft.com/office/drawing/2010/main" val="0"/>
+              </a:ext>
+            </a:extLst>
+          </a:blip>
+          <a:stretch>
+            <a:fillRect/>
+          </a:stretch>
+        </p:blipFill>
+        <p:spPr>
+          <a:xfrm>
+            <a:off x="130315" y="4638674"/>
+            <a:ext cx="1488935" cy="374933"/>
+          </a:xfrm>
+          <a:prstGeom prst="rect">
+            <a:avLst/>
+          </a:prstGeom>
+          <a:effectLst/>
+        </p:spPr>
+      </p:pic>
     </p:spTree>
     <p:extLst>
       <p:ext uri="{BB962C8B-B14F-4D97-AF65-F5344CB8AC3E}">
@@ -17018,6 +17166,43 @@
           <a:prstGeom prst="rect">
             <a:avLst/>
           </a:prstGeom>
+        </p:spPr>
+      </p:pic>
+      <p:pic>
+        <p:nvPicPr>
+          <p:cNvPr id="7" name="Picture 13">
+            <a:extLst>
+              <a:ext uri="{FF2B5EF4-FFF2-40B4-BE49-F238E27FC236}">
+                <a16:creationId xmlns:a16="http://schemas.microsoft.com/office/drawing/2014/main" id="{0197CDCF-A6E5-48AC-9CE3-665F6CC73C8F}"/>
+              </a:ext>
+            </a:extLst>
+          </p:cNvPr>
+          <p:cNvPicPr>
+            <a:picLocks noChangeAspect="1"/>
+          </p:cNvPicPr>
+          <p:nvPr/>
+        </p:nvPicPr>
+        <p:blipFill>
+          <a:blip r:embed="rId3">
+            <a:extLst>
+              <a:ext uri="{28A0092B-C50C-407E-A947-70E740481C1C}">
+                <a14:useLocalDpi xmlns:a14="http://schemas.microsoft.com/office/drawing/2010/main" val="0"/>
+              </a:ext>
+            </a:extLst>
+          </a:blip>
+          <a:stretch>
+            <a:fillRect/>
+          </a:stretch>
+        </p:blipFill>
+        <p:spPr>
+          <a:xfrm>
+            <a:off x="130315" y="4638674"/>
+            <a:ext cx="1488935" cy="374933"/>
+          </a:xfrm>
+          <a:prstGeom prst="rect">
+            <a:avLst/>
+          </a:prstGeom>
+          <a:effectLst/>
         </p:spPr>
       </p:pic>
     </p:spTree>
@@ -17236,6 +17421,43 @@
           </a:p>
         </p:txBody>
       </p:sp>
+      <p:pic>
+        <p:nvPicPr>
+          <p:cNvPr id="7" name="Picture 13">
+            <a:extLst>
+              <a:ext uri="{FF2B5EF4-FFF2-40B4-BE49-F238E27FC236}">
+                <a16:creationId xmlns:a16="http://schemas.microsoft.com/office/drawing/2014/main" id="{35D26045-6645-4E63-9F07-06A24EEFDC69}"/>
+              </a:ext>
+            </a:extLst>
+          </p:cNvPr>
+          <p:cNvPicPr>
+            <a:picLocks noChangeAspect="1"/>
+          </p:cNvPicPr>
+          <p:nvPr/>
+        </p:nvPicPr>
+        <p:blipFill>
+          <a:blip r:embed="rId2">
+            <a:extLst>
+              <a:ext uri="{28A0092B-C50C-407E-A947-70E740481C1C}">
+                <a14:useLocalDpi xmlns:a14="http://schemas.microsoft.com/office/drawing/2010/main" val="0"/>
+              </a:ext>
+            </a:extLst>
+          </a:blip>
+          <a:stretch>
+            <a:fillRect/>
+          </a:stretch>
+        </p:blipFill>
+        <p:spPr>
+          <a:xfrm>
+            <a:off x="130315" y="4638674"/>
+            <a:ext cx="1488935" cy="374933"/>
+          </a:xfrm>
+          <a:prstGeom prst="rect">
+            <a:avLst/>
+          </a:prstGeom>
+          <a:effectLst/>
+        </p:spPr>
+      </p:pic>
     </p:spTree>
     <p:extLst>
       <p:ext uri="{BB962C8B-B14F-4D97-AF65-F5344CB8AC3E}">
@@ -17377,6 +17599,43 @@
           </a:p>
         </p:txBody>
       </p:sp>
+      <p:pic>
+        <p:nvPicPr>
+          <p:cNvPr id="4" name="Picture 13">
+            <a:extLst>
+              <a:ext uri="{FF2B5EF4-FFF2-40B4-BE49-F238E27FC236}">
+                <a16:creationId xmlns:a16="http://schemas.microsoft.com/office/drawing/2014/main" id="{42C20B3B-26E8-4B14-A387-44666F501874}"/>
+              </a:ext>
+            </a:extLst>
+          </p:cNvPr>
+          <p:cNvPicPr>
+            <a:picLocks noChangeAspect="1"/>
+          </p:cNvPicPr>
+          <p:nvPr/>
+        </p:nvPicPr>
+        <p:blipFill>
+          <a:blip r:embed="rId2">
+            <a:extLst>
+              <a:ext uri="{28A0092B-C50C-407E-A947-70E740481C1C}">
+                <a14:useLocalDpi xmlns:a14="http://schemas.microsoft.com/office/drawing/2010/main" val="0"/>
+              </a:ext>
+            </a:extLst>
+          </a:blip>
+          <a:stretch>
+            <a:fillRect/>
+          </a:stretch>
+        </p:blipFill>
+        <p:spPr>
+          <a:xfrm>
+            <a:off x="130315" y="4638674"/>
+            <a:ext cx="1488935" cy="374933"/>
+          </a:xfrm>
+          <a:prstGeom prst="rect">
+            <a:avLst/>
+          </a:prstGeom>
+          <a:effectLst/>
+        </p:spPr>
+      </p:pic>
     </p:spTree>
     <p:extLst>
       <p:ext uri="{BB962C8B-B14F-4D97-AF65-F5344CB8AC3E}">
@@ -17598,6 +17857,43 @@
           </a:prstGeom>
         </p:spPr>
       </p:pic>
+      <p:pic>
+        <p:nvPicPr>
+          <p:cNvPr id="4" name="Picture 13">
+            <a:extLst>
+              <a:ext uri="{FF2B5EF4-FFF2-40B4-BE49-F238E27FC236}">
+                <a16:creationId xmlns:a16="http://schemas.microsoft.com/office/drawing/2014/main" id="{929F6DF5-20BC-4211-8E29-859F1B4C2AAE}"/>
+              </a:ext>
+            </a:extLst>
+          </p:cNvPr>
+          <p:cNvPicPr>
+            <a:picLocks noChangeAspect="1"/>
+          </p:cNvPicPr>
+          <p:nvPr/>
+        </p:nvPicPr>
+        <p:blipFill>
+          <a:blip r:embed="rId3">
+            <a:extLst>
+              <a:ext uri="{28A0092B-C50C-407E-A947-70E740481C1C}">
+                <a14:useLocalDpi xmlns:a14="http://schemas.microsoft.com/office/drawing/2010/main" val="0"/>
+              </a:ext>
+            </a:extLst>
+          </a:blip>
+          <a:stretch>
+            <a:fillRect/>
+          </a:stretch>
+        </p:blipFill>
+        <p:spPr>
+          <a:xfrm>
+            <a:off x="130315" y="4638674"/>
+            <a:ext cx="1488935" cy="374933"/>
+          </a:xfrm>
+          <a:prstGeom prst="rect">
+            <a:avLst/>
+          </a:prstGeom>
+          <a:effectLst/>
+        </p:spPr>
+      </p:pic>
     </p:spTree>
     <p:extLst>
       <p:ext uri="{BB962C8B-B14F-4D97-AF65-F5344CB8AC3E}">
@@ -17702,6 +17998,43 @@
           </a:p>
         </p:txBody>
       </p:sp>
+      <p:pic>
+        <p:nvPicPr>
+          <p:cNvPr id="4" name="Picture 13">
+            <a:extLst>
+              <a:ext uri="{FF2B5EF4-FFF2-40B4-BE49-F238E27FC236}">
+                <a16:creationId xmlns:a16="http://schemas.microsoft.com/office/drawing/2014/main" id="{D13B635D-5559-4E0E-8336-EDFA8C364800}"/>
+              </a:ext>
+            </a:extLst>
+          </p:cNvPr>
+          <p:cNvPicPr>
+            <a:picLocks noChangeAspect="1"/>
+          </p:cNvPicPr>
+          <p:nvPr/>
+        </p:nvPicPr>
+        <p:blipFill>
+          <a:blip r:embed="rId2">
+            <a:extLst>
+              <a:ext uri="{28A0092B-C50C-407E-A947-70E740481C1C}">
+                <a14:useLocalDpi xmlns:a14="http://schemas.microsoft.com/office/drawing/2010/main" val="0"/>
+              </a:ext>
+            </a:extLst>
+          </a:blip>
+          <a:stretch>
+            <a:fillRect/>
+          </a:stretch>
+        </p:blipFill>
+        <p:spPr>
+          <a:xfrm>
+            <a:off x="130315" y="4638674"/>
+            <a:ext cx="1488935" cy="374933"/>
+          </a:xfrm>
+          <a:prstGeom prst="rect">
+            <a:avLst/>
+          </a:prstGeom>
+          <a:effectLst/>
+        </p:spPr>
+      </p:pic>
     </p:spTree>
     <p:extLst>
       <p:ext uri="{BB962C8B-B14F-4D97-AF65-F5344CB8AC3E}">
@@ -17812,6 +18145,43 @@
           </a:p>
         </p:txBody>
       </p:sp>
+      <p:pic>
+        <p:nvPicPr>
+          <p:cNvPr id="4" name="Picture 13">
+            <a:extLst>
+              <a:ext uri="{FF2B5EF4-FFF2-40B4-BE49-F238E27FC236}">
+                <a16:creationId xmlns:a16="http://schemas.microsoft.com/office/drawing/2014/main" id="{FDF6D5C0-7196-462D-9170-D250B6A41756}"/>
+              </a:ext>
+            </a:extLst>
+          </p:cNvPr>
+          <p:cNvPicPr>
+            <a:picLocks noChangeAspect="1"/>
+          </p:cNvPicPr>
+          <p:nvPr/>
+        </p:nvPicPr>
+        <p:blipFill>
+          <a:blip r:embed="rId2">
+            <a:extLst>
+              <a:ext uri="{28A0092B-C50C-407E-A947-70E740481C1C}">
+                <a14:useLocalDpi xmlns:a14="http://schemas.microsoft.com/office/drawing/2010/main" val="0"/>
+              </a:ext>
+            </a:extLst>
+          </a:blip>
+          <a:stretch>
+            <a:fillRect/>
+          </a:stretch>
+        </p:blipFill>
+        <p:spPr>
+          <a:xfrm>
+            <a:off x="130315" y="4638674"/>
+            <a:ext cx="1488935" cy="374933"/>
+          </a:xfrm>
+          <a:prstGeom prst="rect">
+            <a:avLst/>
+          </a:prstGeom>
+          <a:effectLst/>
+        </p:spPr>
+      </p:pic>
     </p:spTree>
     <p:extLst>
       <p:ext uri="{BB962C8B-B14F-4D97-AF65-F5344CB8AC3E}">
@@ -17939,8 +18309,8 @@
         </p:nvSpPr>
         <p:spPr>
           <a:xfrm>
-            <a:off x="874782" y="1288800"/>
-            <a:ext cx="3961800" cy="1656000"/>
+            <a:off x="874781" y="1288800"/>
+            <a:ext cx="6830943" cy="1656000"/>
           </a:xfrm>
           <a:prstGeom prst="rect">
             <a:avLst/>
@@ -17958,9 +18328,24 @@
               <a:buChar char="•"/>
             </a:pPr>
             <a:r>
-              <a:rPr lang="en-US" dirty="0"/>
-              <a:t>URL1:</a:t>
-            </a:r>
+              <a:rPr lang="en-US" dirty="0">
+                <a:latin typeface="Nirmala UI" panose="020B0502040204020203" pitchFamily="34" charset="0"/>
+                <a:cs typeface="Nirmala UI" panose="020B0502040204020203" pitchFamily="34" charset="0"/>
+              </a:rPr>
+              <a:t>Babel Git: </a:t>
+            </a:r>
+            <a:r>
+              <a:rPr lang="es-ES" sz="1400" dirty="0">
+                <a:latin typeface="Nirmala UI" panose="020B0502040204020203" pitchFamily="34" charset="0"/>
+                <a:cs typeface="Nirmala UI" panose="020B0502040204020203" pitchFamily="34" charset="0"/>
+                <a:hlinkClick r:id="rId2"/>
+              </a:rPr>
+              <a:t>https://git.babel.es:4433/</a:t>
+            </a:r>
+            <a:endParaRPr lang="en-US" sz="1400" dirty="0">
+              <a:latin typeface="Nirmala UI" panose="020B0502040204020203" pitchFamily="34" charset="0"/>
+              <a:cs typeface="Nirmala UI" panose="020B0502040204020203" pitchFamily="34" charset="0"/>
+            </a:endParaRPr>
           </a:p>
           <a:p>
             <a:pPr marL="285750" indent="-285750">
@@ -17971,9 +18356,22 @@
               <a:buChar char="•"/>
             </a:pPr>
             <a:r>
-              <a:rPr lang="en-US" dirty="0"/>
-              <a:t>URL2:</a:t>
-            </a:r>
+              <a:rPr lang="en-US" dirty="0">
+                <a:latin typeface="Nirmala UI" panose="020B0502040204020203" pitchFamily="34" charset="0"/>
+                <a:cs typeface="Nirmala UI" panose="020B0502040204020203" pitchFamily="34" charset="0"/>
+              </a:rPr>
+              <a:t>PPT: </a:t>
+            </a:r>
+            <a:r>
+              <a:rPr lang="es-ES" sz="1400" dirty="0">
+                <a:hlinkClick r:id="rId3"/>
+              </a:rPr>
+              <a:t>https://github.com/shashwatx/git_101/blob/master/presentation.pptx</a:t>
+            </a:r>
+            <a:endParaRPr lang="en-US" sz="1400" dirty="0">
+              <a:latin typeface="Nirmala UI" panose="020B0502040204020203" pitchFamily="34" charset="0"/>
+              <a:cs typeface="Nirmala UI" panose="020B0502040204020203" pitchFamily="34" charset="0"/>
+            </a:endParaRPr>
           </a:p>
           <a:p>
             <a:pPr marL="285750" indent="-285750">
@@ -18041,7 +18439,7 @@
           <p:nvPr/>
         </p:nvPicPr>
         <p:blipFill>
-          <a:blip r:embed="rId2">
+          <a:blip r:embed="rId4">
             <a:extLst>
               <a:ext uri="{28A0092B-C50C-407E-A947-70E740481C1C}">
                 <a14:useLocalDpi xmlns:a14="http://schemas.microsoft.com/office/drawing/2010/main" val="0"/>
@@ -18188,6 +18586,43 @@
           </a:p>
         </p:txBody>
       </p:sp>
+      <p:pic>
+        <p:nvPicPr>
+          <p:cNvPr id="4" name="Picture 13">
+            <a:extLst>
+              <a:ext uri="{FF2B5EF4-FFF2-40B4-BE49-F238E27FC236}">
+                <a16:creationId xmlns:a16="http://schemas.microsoft.com/office/drawing/2014/main" id="{5DD1EC31-5755-49C0-8514-AC0AD3C7068B}"/>
+              </a:ext>
+            </a:extLst>
+          </p:cNvPr>
+          <p:cNvPicPr>
+            <a:picLocks noChangeAspect="1"/>
+          </p:cNvPicPr>
+          <p:nvPr/>
+        </p:nvPicPr>
+        <p:blipFill>
+          <a:blip r:embed="rId2">
+            <a:extLst>
+              <a:ext uri="{28A0092B-C50C-407E-A947-70E740481C1C}">
+                <a14:useLocalDpi xmlns:a14="http://schemas.microsoft.com/office/drawing/2010/main" val="0"/>
+              </a:ext>
+            </a:extLst>
+          </a:blip>
+          <a:stretch>
+            <a:fillRect/>
+          </a:stretch>
+        </p:blipFill>
+        <p:spPr>
+          <a:xfrm>
+            <a:off x="130315" y="4638674"/>
+            <a:ext cx="1488935" cy="374933"/>
+          </a:xfrm>
+          <a:prstGeom prst="rect">
+            <a:avLst/>
+          </a:prstGeom>
+          <a:effectLst/>
+        </p:spPr>
+      </p:pic>
     </p:spTree>
     <p:extLst>
       <p:ext uri="{BB962C8B-B14F-4D97-AF65-F5344CB8AC3E}">
@@ -18300,6 +18735,43 @@
           <a:prstGeom prst="rect">
             <a:avLst/>
           </a:prstGeom>
+        </p:spPr>
+      </p:pic>
+      <p:pic>
+        <p:nvPicPr>
+          <p:cNvPr id="6" name="Picture 13">
+            <a:extLst>
+              <a:ext uri="{FF2B5EF4-FFF2-40B4-BE49-F238E27FC236}">
+                <a16:creationId xmlns:a16="http://schemas.microsoft.com/office/drawing/2014/main" id="{296EA284-3145-4798-B3D2-A90D29228D4D}"/>
+              </a:ext>
+            </a:extLst>
+          </p:cNvPr>
+          <p:cNvPicPr>
+            <a:picLocks noChangeAspect="1"/>
+          </p:cNvPicPr>
+          <p:nvPr/>
+        </p:nvPicPr>
+        <p:blipFill>
+          <a:blip r:embed="rId3">
+            <a:extLst>
+              <a:ext uri="{28A0092B-C50C-407E-A947-70E740481C1C}">
+                <a14:useLocalDpi xmlns:a14="http://schemas.microsoft.com/office/drawing/2010/main" val="0"/>
+              </a:ext>
+            </a:extLst>
+          </a:blip>
+          <a:stretch>
+            <a:fillRect/>
+          </a:stretch>
+        </p:blipFill>
+        <p:spPr>
+          <a:xfrm>
+            <a:off x="130315" y="4638674"/>
+            <a:ext cx="1488935" cy="374933"/>
+          </a:xfrm>
+          <a:prstGeom prst="rect">
+            <a:avLst/>
+          </a:prstGeom>
+          <a:effectLst/>
         </p:spPr>
       </p:pic>
     </p:spTree>
@@ -18424,6 +18896,43 @@
           </a:prstGeom>
         </p:spPr>
       </p:pic>
+      <p:pic>
+        <p:nvPicPr>
+          <p:cNvPr id="5" name="Picture 13">
+            <a:extLst>
+              <a:ext uri="{FF2B5EF4-FFF2-40B4-BE49-F238E27FC236}">
+                <a16:creationId xmlns:a16="http://schemas.microsoft.com/office/drawing/2014/main" id="{65CAE2E7-043A-4D35-A869-14E0BAE4680F}"/>
+              </a:ext>
+            </a:extLst>
+          </p:cNvPr>
+          <p:cNvPicPr>
+            <a:picLocks noChangeAspect="1"/>
+          </p:cNvPicPr>
+          <p:nvPr/>
+        </p:nvPicPr>
+        <p:blipFill>
+          <a:blip r:embed="rId3">
+            <a:extLst>
+              <a:ext uri="{28A0092B-C50C-407E-A947-70E740481C1C}">
+                <a14:useLocalDpi xmlns:a14="http://schemas.microsoft.com/office/drawing/2010/main" val="0"/>
+              </a:ext>
+            </a:extLst>
+          </a:blip>
+          <a:stretch>
+            <a:fillRect/>
+          </a:stretch>
+        </p:blipFill>
+        <p:spPr>
+          <a:xfrm>
+            <a:off x="130315" y="4638674"/>
+            <a:ext cx="1488935" cy="374933"/>
+          </a:xfrm>
+          <a:prstGeom prst="rect">
+            <a:avLst/>
+          </a:prstGeom>
+          <a:effectLst/>
+        </p:spPr>
+      </p:pic>
     </p:spTree>
     <p:extLst>
       <p:ext uri="{BB962C8B-B14F-4D97-AF65-F5344CB8AC3E}">
@@ -18514,6 +19023,43 @@
           </a:p>
         </p:txBody>
       </p:sp>
+      <p:pic>
+        <p:nvPicPr>
+          <p:cNvPr id="4" name="Picture 13">
+            <a:extLst>
+              <a:ext uri="{FF2B5EF4-FFF2-40B4-BE49-F238E27FC236}">
+                <a16:creationId xmlns:a16="http://schemas.microsoft.com/office/drawing/2014/main" id="{023B8791-8DAD-43B9-A31A-C933DA952B24}"/>
+              </a:ext>
+            </a:extLst>
+          </p:cNvPr>
+          <p:cNvPicPr>
+            <a:picLocks noChangeAspect="1"/>
+          </p:cNvPicPr>
+          <p:nvPr/>
+        </p:nvPicPr>
+        <p:blipFill>
+          <a:blip r:embed="rId2">
+            <a:extLst>
+              <a:ext uri="{28A0092B-C50C-407E-A947-70E740481C1C}">
+                <a14:useLocalDpi xmlns:a14="http://schemas.microsoft.com/office/drawing/2010/main" val="0"/>
+              </a:ext>
+            </a:extLst>
+          </a:blip>
+          <a:stretch>
+            <a:fillRect/>
+          </a:stretch>
+        </p:blipFill>
+        <p:spPr>
+          <a:xfrm>
+            <a:off x="130315" y="4638674"/>
+            <a:ext cx="1488935" cy="374933"/>
+          </a:xfrm>
+          <a:prstGeom prst="rect">
+            <a:avLst/>
+          </a:prstGeom>
+          <a:effectLst/>
+        </p:spPr>
+      </p:pic>
     </p:spTree>
     <p:extLst>
       <p:ext uri="{BB962C8B-B14F-4D97-AF65-F5344CB8AC3E}">
@@ -18626,6 +19172,43 @@
           <a:prstGeom prst="rect">
             <a:avLst/>
           </a:prstGeom>
+        </p:spPr>
+      </p:pic>
+      <p:pic>
+        <p:nvPicPr>
+          <p:cNvPr id="6" name="Picture 13">
+            <a:extLst>
+              <a:ext uri="{FF2B5EF4-FFF2-40B4-BE49-F238E27FC236}">
+                <a16:creationId xmlns:a16="http://schemas.microsoft.com/office/drawing/2014/main" id="{6C92CD0C-6C9F-48E9-A6BF-61B1E96537E0}"/>
+              </a:ext>
+            </a:extLst>
+          </p:cNvPr>
+          <p:cNvPicPr>
+            <a:picLocks noChangeAspect="1"/>
+          </p:cNvPicPr>
+          <p:nvPr/>
+        </p:nvPicPr>
+        <p:blipFill>
+          <a:blip r:embed="rId3">
+            <a:extLst>
+              <a:ext uri="{28A0092B-C50C-407E-A947-70E740481C1C}">
+                <a14:useLocalDpi xmlns:a14="http://schemas.microsoft.com/office/drawing/2010/main" val="0"/>
+              </a:ext>
+            </a:extLst>
+          </a:blip>
+          <a:stretch>
+            <a:fillRect/>
+          </a:stretch>
+        </p:blipFill>
+        <p:spPr>
+          <a:xfrm>
+            <a:off x="130315" y="4638674"/>
+            <a:ext cx="1488935" cy="374933"/>
+          </a:xfrm>
+          <a:prstGeom prst="rect">
+            <a:avLst/>
+          </a:prstGeom>
+          <a:effectLst/>
         </p:spPr>
       </p:pic>
     </p:spTree>
@@ -18739,6 +19322,43 @@
           </a:p>
         </p:txBody>
       </p:sp>
+      <p:pic>
+        <p:nvPicPr>
+          <p:cNvPr id="4" name="Picture 13">
+            <a:extLst>
+              <a:ext uri="{FF2B5EF4-FFF2-40B4-BE49-F238E27FC236}">
+                <a16:creationId xmlns:a16="http://schemas.microsoft.com/office/drawing/2014/main" id="{31F5F925-BF09-42EC-A78E-31CACB09C4B7}"/>
+              </a:ext>
+            </a:extLst>
+          </p:cNvPr>
+          <p:cNvPicPr>
+            <a:picLocks noChangeAspect="1"/>
+          </p:cNvPicPr>
+          <p:nvPr/>
+        </p:nvPicPr>
+        <p:blipFill>
+          <a:blip r:embed="rId2">
+            <a:extLst>
+              <a:ext uri="{28A0092B-C50C-407E-A947-70E740481C1C}">
+                <a14:useLocalDpi xmlns:a14="http://schemas.microsoft.com/office/drawing/2010/main" val="0"/>
+              </a:ext>
+            </a:extLst>
+          </a:blip>
+          <a:stretch>
+            <a:fillRect/>
+          </a:stretch>
+        </p:blipFill>
+        <p:spPr>
+          <a:xfrm>
+            <a:off x="130315" y="4638674"/>
+            <a:ext cx="1488935" cy="374933"/>
+          </a:xfrm>
+          <a:prstGeom prst="rect">
+            <a:avLst/>
+          </a:prstGeom>
+          <a:effectLst/>
+        </p:spPr>
+      </p:pic>
     </p:spTree>
     <p:extLst>
       <p:ext uri="{BB962C8B-B14F-4D97-AF65-F5344CB8AC3E}">
@@ -18848,6 +19468,43 @@
           </a:p>
         </p:txBody>
       </p:sp>
+      <p:pic>
+        <p:nvPicPr>
+          <p:cNvPr id="4" name="Picture 13">
+            <a:extLst>
+              <a:ext uri="{FF2B5EF4-FFF2-40B4-BE49-F238E27FC236}">
+                <a16:creationId xmlns:a16="http://schemas.microsoft.com/office/drawing/2014/main" id="{574DE4CE-5D4F-4525-A359-1C29A38FC9B3}"/>
+              </a:ext>
+            </a:extLst>
+          </p:cNvPr>
+          <p:cNvPicPr>
+            <a:picLocks noChangeAspect="1"/>
+          </p:cNvPicPr>
+          <p:nvPr/>
+        </p:nvPicPr>
+        <p:blipFill>
+          <a:blip r:embed="rId2">
+            <a:extLst>
+              <a:ext uri="{28A0092B-C50C-407E-A947-70E740481C1C}">
+                <a14:useLocalDpi xmlns:a14="http://schemas.microsoft.com/office/drawing/2010/main" val="0"/>
+              </a:ext>
+            </a:extLst>
+          </a:blip>
+          <a:stretch>
+            <a:fillRect/>
+          </a:stretch>
+        </p:blipFill>
+        <p:spPr>
+          <a:xfrm>
+            <a:off x="130315" y="4638674"/>
+            <a:ext cx="1488935" cy="374933"/>
+          </a:xfrm>
+          <a:prstGeom prst="rect">
+            <a:avLst/>
+          </a:prstGeom>
+          <a:effectLst/>
+        </p:spPr>
+      </p:pic>
     </p:spTree>
     <p:extLst>
       <p:ext uri="{BB962C8B-B14F-4D97-AF65-F5344CB8AC3E}">
@@ -18976,6 +19633,43 @@
           <a:prstGeom prst="rect">
             <a:avLst/>
           </a:prstGeom>
+        </p:spPr>
+      </p:pic>
+      <p:pic>
+        <p:nvPicPr>
+          <p:cNvPr id="5" name="Picture 13">
+            <a:extLst>
+              <a:ext uri="{FF2B5EF4-FFF2-40B4-BE49-F238E27FC236}">
+                <a16:creationId xmlns:a16="http://schemas.microsoft.com/office/drawing/2014/main" id="{02118687-C5D3-4BB2-B971-E64AD3A750E2}"/>
+              </a:ext>
+            </a:extLst>
+          </p:cNvPr>
+          <p:cNvPicPr>
+            <a:picLocks noChangeAspect="1"/>
+          </p:cNvPicPr>
+          <p:nvPr/>
+        </p:nvPicPr>
+        <p:blipFill>
+          <a:blip r:embed="rId3">
+            <a:extLst>
+              <a:ext uri="{28A0092B-C50C-407E-A947-70E740481C1C}">
+                <a14:useLocalDpi xmlns:a14="http://schemas.microsoft.com/office/drawing/2010/main" val="0"/>
+              </a:ext>
+            </a:extLst>
+          </a:blip>
+          <a:stretch>
+            <a:fillRect/>
+          </a:stretch>
+        </p:blipFill>
+        <p:spPr>
+          <a:xfrm>
+            <a:off x="130315" y="4638674"/>
+            <a:ext cx="1488935" cy="374933"/>
+          </a:xfrm>
+          <a:prstGeom prst="rect">
+            <a:avLst/>
+          </a:prstGeom>
+          <a:effectLst/>
         </p:spPr>
       </p:pic>
     </p:spTree>
@@ -19098,6 +19792,43 @@
           </a:extLst>
         </p:spPr>
       </p:pic>
+      <p:pic>
+        <p:nvPicPr>
+          <p:cNvPr id="5" name="Picture 13">
+            <a:extLst>
+              <a:ext uri="{FF2B5EF4-FFF2-40B4-BE49-F238E27FC236}">
+                <a16:creationId xmlns:a16="http://schemas.microsoft.com/office/drawing/2014/main" id="{186723C8-9DF6-435E-9E80-6A4D62471CB4}"/>
+              </a:ext>
+            </a:extLst>
+          </p:cNvPr>
+          <p:cNvPicPr>
+            <a:picLocks noChangeAspect="1"/>
+          </p:cNvPicPr>
+          <p:nvPr/>
+        </p:nvPicPr>
+        <p:blipFill>
+          <a:blip r:embed="rId3">
+            <a:extLst>
+              <a:ext uri="{28A0092B-C50C-407E-A947-70E740481C1C}">
+                <a14:useLocalDpi xmlns:a14="http://schemas.microsoft.com/office/drawing/2010/main" val="0"/>
+              </a:ext>
+            </a:extLst>
+          </a:blip>
+          <a:stretch>
+            <a:fillRect/>
+          </a:stretch>
+        </p:blipFill>
+        <p:spPr>
+          <a:xfrm>
+            <a:off x="130315" y="4638674"/>
+            <a:ext cx="1488935" cy="374933"/>
+          </a:xfrm>
+          <a:prstGeom prst="rect">
+            <a:avLst/>
+          </a:prstGeom>
+          <a:effectLst/>
+        </p:spPr>
+      </p:pic>
     </p:spTree>
     <p:extLst>
       <p:ext uri="{BB962C8B-B14F-4D97-AF65-F5344CB8AC3E}">
@@ -19206,6 +19937,43 @@
           </a:p>
         </p:txBody>
       </p:sp>
+      <p:pic>
+        <p:nvPicPr>
+          <p:cNvPr id="4" name="Picture 13">
+            <a:extLst>
+              <a:ext uri="{FF2B5EF4-FFF2-40B4-BE49-F238E27FC236}">
+                <a16:creationId xmlns:a16="http://schemas.microsoft.com/office/drawing/2014/main" id="{CEAEA6CA-13CF-4615-B7F3-335A1AC9A653}"/>
+              </a:ext>
+            </a:extLst>
+          </p:cNvPr>
+          <p:cNvPicPr>
+            <a:picLocks noChangeAspect="1"/>
+          </p:cNvPicPr>
+          <p:nvPr/>
+        </p:nvPicPr>
+        <p:blipFill>
+          <a:blip r:embed="rId2">
+            <a:extLst>
+              <a:ext uri="{28A0092B-C50C-407E-A947-70E740481C1C}">
+                <a14:useLocalDpi xmlns:a14="http://schemas.microsoft.com/office/drawing/2010/main" val="0"/>
+              </a:ext>
+            </a:extLst>
+          </a:blip>
+          <a:stretch>
+            <a:fillRect/>
+          </a:stretch>
+        </p:blipFill>
+        <p:spPr>
+          <a:xfrm>
+            <a:off x="130315" y="4638674"/>
+            <a:ext cx="1488935" cy="374933"/>
+          </a:xfrm>
+          <a:prstGeom prst="rect">
+            <a:avLst/>
+          </a:prstGeom>
+          <a:effectLst/>
+        </p:spPr>
+      </p:pic>
     </p:spTree>
     <p:extLst>
       <p:ext uri="{BB962C8B-B14F-4D97-AF65-F5344CB8AC3E}">
@@ -19514,6 +20282,43 @@
           </a:p>
         </p:txBody>
       </p:sp>
+      <p:pic>
+        <p:nvPicPr>
+          <p:cNvPr id="4" name="Picture 13">
+            <a:extLst>
+              <a:ext uri="{FF2B5EF4-FFF2-40B4-BE49-F238E27FC236}">
+                <a16:creationId xmlns:a16="http://schemas.microsoft.com/office/drawing/2014/main" id="{4DA35C47-EB3A-433E-B1C9-E1B8A38879E9}"/>
+              </a:ext>
+            </a:extLst>
+          </p:cNvPr>
+          <p:cNvPicPr>
+            <a:picLocks noChangeAspect="1"/>
+          </p:cNvPicPr>
+          <p:nvPr/>
+        </p:nvPicPr>
+        <p:blipFill>
+          <a:blip r:embed="rId2">
+            <a:extLst>
+              <a:ext uri="{28A0092B-C50C-407E-A947-70E740481C1C}">
+                <a14:useLocalDpi xmlns:a14="http://schemas.microsoft.com/office/drawing/2010/main" val="0"/>
+              </a:ext>
+            </a:extLst>
+          </a:blip>
+          <a:stretch>
+            <a:fillRect/>
+          </a:stretch>
+        </p:blipFill>
+        <p:spPr>
+          <a:xfrm>
+            <a:off x="130315" y="4638674"/>
+            <a:ext cx="1488935" cy="374933"/>
+          </a:xfrm>
+          <a:prstGeom prst="rect">
+            <a:avLst/>
+          </a:prstGeom>
+          <a:effectLst/>
+        </p:spPr>
+      </p:pic>
     </p:spTree>
     <p:extLst>
       <p:ext uri="{BB962C8B-B14F-4D97-AF65-F5344CB8AC3E}">
@@ -19634,7 +20439,7 @@
         </p:nvSpPr>
         <p:spPr>
           <a:xfrm>
-            <a:off x="685800" y="3836160"/>
+            <a:off x="685800" y="3415503"/>
             <a:ext cx="3042634" cy="1006560"/>
           </a:xfrm>
           <a:prstGeom prst="rect">
@@ -19659,7 +20464,8 @@
                 <a:solidFill>
                   <a:srgbClr val="666666"/>
                 </a:solidFill>
-                <a:latin typeface="Karla"/>
+                <a:latin typeface="Gadugi" panose="020B0502040204020203" pitchFamily="34" charset="0"/>
+                <a:ea typeface="Gadugi" panose="020B0502040204020203" pitchFamily="34" charset="0"/>
               </a:rPr>
               <a:t>Shashwat Mishra</a:t>
             </a:r>
@@ -19671,15 +20477,38 @@
               </a:lnSpc>
             </a:pPr>
             <a:r>
-              <a:rPr lang="en-IN" sz="1500" dirty="0">
+              <a:rPr lang="en-IN" dirty="0">
                 <a:solidFill>
                   <a:srgbClr val="666666"/>
                 </a:solidFill>
-                <a:latin typeface="Karla"/>
+                <a:latin typeface="Gadugi" panose="020B0502040204020203" pitchFamily="34" charset="0"/>
+                <a:ea typeface="Gadugi" panose="020B0502040204020203" pitchFamily="34" charset="0"/>
               </a:rPr>
-              <a:t>shashwat.Mishra@babel.es</a:t>
-            </a:r>
-          </a:p>
+              <a:t>shashwat.mishra@babel.es</a:t>
+            </a:r>
+          </a:p>
+        </p:txBody>
+      </p:sp>
+      <p:sp>
+        <p:nvSpPr>
+          <p:cNvPr id="2" name="Rectangle 1"/>
+          <p:cNvSpPr/>
+          <p:nvPr/>
+        </p:nvSpPr>
+        <p:spPr>
+          <a:xfrm>
+            <a:off x="3674383" y="3471066"/>
+            <a:ext cx="4572000" cy="677108"/>
+          </a:xfrm>
+          <a:prstGeom prst="rect">
+            <a:avLst/>
+          </a:prstGeom>
+        </p:spPr>
+        <p:txBody>
+          <a:bodyPr>
+            <a:spAutoFit/>
+          </a:bodyPr>
+          <a:lstStyle/>
           <a:p>
             <a:pPr algn="ctr">
               <a:lnSpc>
@@ -19687,68 +20516,22 @@
               </a:lnSpc>
             </a:pPr>
             <a:r>
-              <a:rPr lang="en-IN" sz="1500" dirty="0">
+              <a:rPr lang="en-IN" sz="2000" dirty="0">
                 <a:solidFill>
                   <a:srgbClr val="666666"/>
                 </a:solidFill>
-                <a:latin typeface="Karla"/>
+                <a:latin typeface="Gadugi" panose="020B0502040204020203" pitchFamily="34" charset="0"/>
+                <a:ea typeface="Gadugi" panose="020B0502040204020203" pitchFamily="34" charset="0"/>
               </a:rPr>
-              <a:t>shashwatx.github.io</a:t>
-            </a:r>
-          </a:p>
-        </p:txBody>
-      </p:sp>
-      <p:sp>
-        <p:nvSpPr>
-          <p:cNvPr id="2" name="Rectangle 1"/>
-          <p:cNvSpPr/>
-          <p:nvPr/>
-        </p:nvSpPr>
-        <p:spPr>
-          <a:xfrm>
-            <a:off x="3728434" y="3836160"/>
-            <a:ext cx="4572000" cy="954107"/>
-          </a:xfrm>
-          <a:prstGeom prst="rect">
-            <a:avLst/>
-          </a:prstGeom>
-        </p:spPr>
-        <p:txBody>
-          <a:bodyPr>
-            <a:spAutoFit/>
-          </a:bodyPr>
-          <a:lstStyle/>
+              <a:t>Roberto Olmedo</a:t>
+            </a:r>
+          </a:p>
           <a:p>
             <a:pPr algn="ctr">
               <a:lnSpc>
                 <a:spcPct val="100000"/>
               </a:lnSpc>
             </a:pPr>
-            <a:r>
-              <a:rPr lang="en-IN" sz="2000" dirty="0">
-                <a:solidFill>
-                  <a:srgbClr val="666666"/>
-                </a:solidFill>
-                <a:latin typeface="Karla"/>
-              </a:rPr>
-              <a:t>Roberto Olmedo</a:t>
-            </a:r>
-          </a:p>
-          <a:p>
-            <a:pPr algn="ctr">
-              <a:lnSpc>
-                <a:spcPct val="100000"/>
-              </a:lnSpc>
-            </a:pPr>
-            <a:r>
-              <a:rPr lang="en-IN" u="sng" dirty="0">
-                <a:solidFill>
-                  <a:srgbClr val="666666"/>
-                </a:solidFill>
-                <a:latin typeface="Karla"/>
-              </a:rPr>
-              <a:t>roberto</a:t>
-            </a:r>
             <a:r>
               <a:rPr lang="en-IN" dirty="0">
                 <a:solidFill>
@@ -19756,27 +20539,48 @@
                 </a:solidFill>
                 <a:latin typeface="Karla"/>
               </a:rPr>
-              <a:t>.olmedo@babel.es</a:t>
-            </a:r>
-          </a:p>
-          <a:p>
-            <a:pPr algn="ctr">
-              <a:lnSpc>
-                <a:spcPct val="100000"/>
-              </a:lnSpc>
-            </a:pPr>
-            <a:r>
-              <a:rPr lang="en-IN" dirty="0">
-                <a:solidFill>
-                  <a:srgbClr val="666666"/>
-                </a:solidFill>
-                <a:latin typeface="Karla"/>
-              </a:rPr>
-              <a:t>rudranilbasu.me</a:t>
-            </a:r>
-          </a:p>
-        </p:txBody>
-      </p:sp>
+              <a:t>roberto.olmedo@babel.es</a:t>
+            </a:r>
+          </a:p>
+        </p:txBody>
+      </p:sp>
+      <p:pic>
+        <p:nvPicPr>
+          <p:cNvPr id="6" name="Picture 13">
+            <a:extLst>
+              <a:ext uri="{FF2B5EF4-FFF2-40B4-BE49-F238E27FC236}">
+                <a16:creationId xmlns:a16="http://schemas.microsoft.com/office/drawing/2014/main" id="{8619EE1B-6143-4786-8CC7-B1354D27A69C}"/>
+              </a:ext>
+            </a:extLst>
+          </p:cNvPr>
+          <p:cNvPicPr>
+            <a:picLocks noChangeAspect="1"/>
+          </p:cNvPicPr>
+          <p:nvPr/>
+        </p:nvPicPr>
+        <p:blipFill>
+          <a:blip r:embed="rId2">
+            <a:extLst>
+              <a:ext uri="{28A0092B-C50C-407E-A947-70E740481C1C}">
+                <a14:useLocalDpi xmlns:a14="http://schemas.microsoft.com/office/drawing/2010/main" val="0"/>
+              </a:ext>
+            </a:extLst>
+          </a:blip>
+          <a:stretch>
+            <a:fillRect/>
+          </a:stretch>
+        </p:blipFill>
+        <p:spPr>
+          <a:xfrm>
+            <a:off x="130315" y="4638674"/>
+            <a:ext cx="1488935" cy="374933"/>
+          </a:xfrm>
+          <a:prstGeom prst="rect">
+            <a:avLst/>
+          </a:prstGeom>
+          <a:effectLst/>
+        </p:spPr>
+      </p:pic>
     </p:spTree>
     <p:extLst>
       <p:ext uri="{BB962C8B-B14F-4D97-AF65-F5344CB8AC3E}">
@@ -19987,6 +20791,43 @@
           <a:prstGeom prst="rect">
             <a:avLst/>
           </a:prstGeom>
+        </p:spPr>
+      </p:pic>
+      <p:pic>
+        <p:nvPicPr>
+          <p:cNvPr id="4" name="Picture 13">
+            <a:extLst>
+              <a:ext uri="{FF2B5EF4-FFF2-40B4-BE49-F238E27FC236}">
+                <a16:creationId xmlns:a16="http://schemas.microsoft.com/office/drawing/2014/main" id="{B62B0CE6-848A-46A8-B979-90FDD028E3BC}"/>
+              </a:ext>
+            </a:extLst>
+          </p:cNvPr>
+          <p:cNvPicPr>
+            <a:picLocks noChangeAspect="1"/>
+          </p:cNvPicPr>
+          <p:nvPr/>
+        </p:nvPicPr>
+        <p:blipFill>
+          <a:blip r:embed="rId3">
+            <a:extLst>
+              <a:ext uri="{28A0092B-C50C-407E-A947-70E740481C1C}">
+                <a14:useLocalDpi xmlns:a14="http://schemas.microsoft.com/office/drawing/2010/main" val="0"/>
+              </a:ext>
+            </a:extLst>
+          </a:blip>
+          <a:stretch>
+            <a:fillRect/>
+          </a:stretch>
+        </p:blipFill>
+        <p:spPr>
+          <a:xfrm>
+            <a:off x="130315" y="4638674"/>
+            <a:ext cx="1488935" cy="374933"/>
+          </a:xfrm>
+          <a:prstGeom prst="rect">
+            <a:avLst/>
+          </a:prstGeom>
+          <a:effectLst/>
         </p:spPr>
       </p:pic>
     </p:spTree>
@@ -20138,6 +20979,43 @@
           </a:p>
         </p:txBody>
       </p:sp>
+      <p:pic>
+        <p:nvPicPr>
+          <p:cNvPr id="4" name="Picture 13">
+            <a:extLst>
+              <a:ext uri="{FF2B5EF4-FFF2-40B4-BE49-F238E27FC236}">
+                <a16:creationId xmlns:a16="http://schemas.microsoft.com/office/drawing/2014/main" id="{9AEA94E0-51F1-4EA7-B4BC-61B4845D42EE}"/>
+              </a:ext>
+            </a:extLst>
+          </p:cNvPr>
+          <p:cNvPicPr>
+            <a:picLocks noChangeAspect="1"/>
+          </p:cNvPicPr>
+          <p:nvPr/>
+        </p:nvPicPr>
+        <p:blipFill>
+          <a:blip r:embed="rId2">
+            <a:extLst>
+              <a:ext uri="{28A0092B-C50C-407E-A947-70E740481C1C}">
+                <a14:useLocalDpi xmlns:a14="http://schemas.microsoft.com/office/drawing/2010/main" val="0"/>
+              </a:ext>
+            </a:extLst>
+          </a:blip>
+          <a:stretch>
+            <a:fillRect/>
+          </a:stretch>
+        </p:blipFill>
+        <p:spPr>
+          <a:xfrm>
+            <a:off x="130315" y="4638674"/>
+            <a:ext cx="1488935" cy="374933"/>
+          </a:xfrm>
+          <a:prstGeom prst="rect">
+            <a:avLst/>
+          </a:prstGeom>
+          <a:effectLst/>
+        </p:spPr>
+      </p:pic>
     </p:spTree>
     <p:extLst>
       <p:ext uri="{BB962C8B-B14F-4D97-AF65-F5344CB8AC3E}">
@@ -20396,6 +21274,43 @@
           </a:prstGeom>
         </p:spPr>
       </p:pic>
+      <p:pic>
+        <p:nvPicPr>
+          <p:cNvPr id="5" name="Picture 13">
+            <a:extLst>
+              <a:ext uri="{FF2B5EF4-FFF2-40B4-BE49-F238E27FC236}">
+                <a16:creationId xmlns:a16="http://schemas.microsoft.com/office/drawing/2014/main" id="{93F3E6AE-A77D-4633-B586-9E40B6B78014}"/>
+              </a:ext>
+            </a:extLst>
+          </p:cNvPr>
+          <p:cNvPicPr>
+            <a:picLocks noChangeAspect="1"/>
+          </p:cNvPicPr>
+          <p:nvPr/>
+        </p:nvPicPr>
+        <p:blipFill>
+          <a:blip r:embed="rId3">
+            <a:extLst>
+              <a:ext uri="{28A0092B-C50C-407E-A947-70E740481C1C}">
+                <a14:useLocalDpi xmlns:a14="http://schemas.microsoft.com/office/drawing/2010/main" val="0"/>
+              </a:ext>
+            </a:extLst>
+          </a:blip>
+          <a:stretch>
+            <a:fillRect/>
+          </a:stretch>
+        </p:blipFill>
+        <p:spPr>
+          <a:xfrm>
+            <a:off x="130315" y="4638674"/>
+            <a:ext cx="1488935" cy="374933"/>
+          </a:xfrm>
+          <a:prstGeom prst="rect">
+            <a:avLst/>
+          </a:prstGeom>
+          <a:effectLst/>
+        </p:spPr>
+      </p:pic>
     </p:spTree>
     <p:extLst>
       <p:ext uri="{BB962C8B-B14F-4D97-AF65-F5344CB8AC3E}">
@@ -20607,6 +21522,43 @@
           <a:prstGeom prst="rect">
             <a:avLst/>
           </a:prstGeom>
+        </p:spPr>
+      </p:pic>
+      <p:pic>
+        <p:nvPicPr>
+          <p:cNvPr id="5" name="Picture 13">
+            <a:extLst>
+              <a:ext uri="{FF2B5EF4-FFF2-40B4-BE49-F238E27FC236}">
+                <a16:creationId xmlns:a16="http://schemas.microsoft.com/office/drawing/2014/main" id="{F52D86DF-0F68-41F4-9B75-60D219F5EBE2}"/>
+              </a:ext>
+            </a:extLst>
+          </p:cNvPr>
+          <p:cNvPicPr>
+            <a:picLocks noChangeAspect="1"/>
+          </p:cNvPicPr>
+          <p:nvPr/>
+        </p:nvPicPr>
+        <p:blipFill>
+          <a:blip r:embed="rId3">
+            <a:extLst>
+              <a:ext uri="{28A0092B-C50C-407E-A947-70E740481C1C}">
+                <a14:useLocalDpi xmlns:a14="http://schemas.microsoft.com/office/drawing/2010/main" val="0"/>
+              </a:ext>
+            </a:extLst>
+          </a:blip>
+          <a:stretch>
+            <a:fillRect/>
+          </a:stretch>
+        </p:blipFill>
+        <p:spPr>
+          <a:xfrm>
+            <a:off x="130315" y="4638674"/>
+            <a:ext cx="1488935" cy="374933"/>
+          </a:xfrm>
+          <a:prstGeom prst="rect">
+            <a:avLst/>
+          </a:prstGeom>
+          <a:effectLst/>
         </p:spPr>
       </p:pic>
     </p:spTree>
@@ -20796,6 +21748,43 @@
           </a:p>
         </p:txBody>
       </p:sp>
+      <p:pic>
+        <p:nvPicPr>
+          <p:cNvPr id="4" name="Picture 13">
+            <a:extLst>
+              <a:ext uri="{FF2B5EF4-FFF2-40B4-BE49-F238E27FC236}">
+                <a16:creationId xmlns:a16="http://schemas.microsoft.com/office/drawing/2014/main" id="{7413E3C0-2024-4283-A70E-D743BF8340A5}"/>
+              </a:ext>
+            </a:extLst>
+          </p:cNvPr>
+          <p:cNvPicPr>
+            <a:picLocks noChangeAspect="1"/>
+          </p:cNvPicPr>
+          <p:nvPr/>
+        </p:nvPicPr>
+        <p:blipFill>
+          <a:blip r:embed="rId2">
+            <a:extLst>
+              <a:ext uri="{28A0092B-C50C-407E-A947-70E740481C1C}">
+                <a14:useLocalDpi xmlns:a14="http://schemas.microsoft.com/office/drawing/2010/main" val="0"/>
+              </a:ext>
+            </a:extLst>
+          </a:blip>
+          <a:stretch>
+            <a:fillRect/>
+          </a:stretch>
+        </p:blipFill>
+        <p:spPr>
+          <a:xfrm>
+            <a:off x="130315" y="4638674"/>
+            <a:ext cx="1488935" cy="374933"/>
+          </a:xfrm>
+          <a:prstGeom prst="rect">
+            <a:avLst/>
+          </a:prstGeom>
+          <a:effectLst/>
+        </p:spPr>
+      </p:pic>
     </p:spTree>
   </p:cSld>
   <p:clrMapOvr>
@@ -20965,6 +21954,43 @@
           </a:p>
         </p:txBody>
       </p:sp>
+      <p:pic>
+        <p:nvPicPr>
+          <p:cNvPr id="6" name="Picture 13">
+            <a:extLst>
+              <a:ext uri="{FF2B5EF4-FFF2-40B4-BE49-F238E27FC236}">
+                <a16:creationId xmlns:a16="http://schemas.microsoft.com/office/drawing/2014/main" id="{3FB623E5-6250-48FA-B01A-9B9E8A43951A}"/>
+              </a:ext>
+            </a:extLst>
+          </p:cNvPr>
+          <p:cNvPicPr>
+            <a:picLocks noChangeAspect="1"/>
+          </p:cNvPicPr>
+          <p:nvPr/>
+        </p:nvPicPr>
+        <p:blipFill>
+          <a:blip r:embed="rId2">
+            <a:extLst>
+              <a:ext uri="{28A0092B-C50C-407E-A947-70E740481C1C}">
+                <a14:useLocalDpi xmlns:a14="http://schemas.microsoft.com/office/drawing/2010/main" val="0"/>
+              </a:ext>
+            </a:extLst>
+          </a:blip>
+          <a:stretch>
+            <a:fillRect/>
+          </a:stretch>
+        </p:blipFill>
+        <p:spPr>
+          <a:xfrm>
+            <a:off x="130315" y="4638674"/>
+            <a:ext cx="1488935" cy="374933"/>
+          </a:xfrm>
+          <a:prstGeom prst="rect">
+            <a:avLst/>
+          </a:prstGeom>
+          <a:effectLst/>
+        </p:spPr>
+      </p:pic>
     </p:spTree>
     <p:extLst>
       <p:ext uri="{BB962C8B-B14F-4D97-AF65-F5344CB8AC3E}">

</xml_diff>

<commit_message>
Some changes to repository.
</commit_message>
<xml_diff>
--- a/presentation.pptx
+++ b/presentation.pptx
@@ -30,19 +30,18 @@
     <p:sldId id="322" r:id="rId24"/>
     <p:sldId id="290" r:id="rId25"/>
     <p:sldId id="323" r:id="rId26"/>
-    <p:sldId id="324" r:id="rId27"/>
-    <p:sldId id="326" r:id="rId28"/>
-    <p:sldId id="337" r:id="rId29"/>
-    <p:sldId id="329" r:id="rId30"/>
+    <p:sldId id="339" r:id="rId27"/>
+    <p:sldId id="324" r:id="rId28"/>
+    <p:sldId id="326" r:id="rId29"/>
+    <p:sldId id="337" r:id="rId30"/>
     <p:sldId id="327" r:id="rId31"/>
     <p:sldId id="338" r:id="rId32"/>
     <p:sldId id="325" r:id="rId33"/>
     <p:sldId id="328" r:id="rId34"/>
-    <p:sldId id="330" r:id="rId35"/>
-    <p:sldId id="339" r:id="rId36"/>
-    <p:sldId id="332" r:id="rId37"/>
-    <p:sldId id="335" r:id="rId38"/>
-    <p:sldId id="334" r:id="rId39"/>
+    <p:sldId id="329" r:id="rId35"/>
+    <p:sldId id="330" r:id="rId36"/>
+    <p:sldId id="335" r:id="rId37"/>
+    <p:sldId id="334" r:id="rId38"/>
   </p:sldIdLst>
   <p:sldSz cx="9144000" cy="5143500" type="screen16x9"/>
   <p:notesSz cx="7559675" cy="10691813"/>
@@ -8829,7 +8828,7 @@
                 </a:solidFill>
               </a:rPr>
               <a:pPr/>
-              <a:t>03-12-2019</a:t>
+              <a:t>04-12-2019</a:t>
             </a:fld>
             <a:endParaRPr lang="en-IN">
               <a:solidFill>
@@ -9030,7 +9029,7 @@
                 </a:solidFill>
               </a:rPr>
               <a:pPr/>
-              <a:t>03-12-2019</a:t>
+              <a:t>04-12-2019</a:t>
             </a:fld>
             <a:endParaRPr lang="en-IN">
               <a:solidFill>
@@ -9319,7 +9318,7 @@
                 </a:solidFill>
               </a:rPr>
               <a:pPr/>
-              <a:t>03-12-2019</a:t>
+              <a:t>04-12-2019</a:t>
             </a:fld>
             <a:endParaRPr lang="en-IN">
               <a:solidFill>
@@ -9638,7 +9637,7 @@
                 </a:solidFill>
               </a:rPr>
               <a:pPr/>
-              <a:t>03-12-2019</a:t>
+              <a:t>04-12-2019</a:t>
             </a:fld>
             <a:endParaRPr lang="en-IN">
               <a:solidFill>
@@ -10111,7 +10110,7 @@
                 </a:solidFill>
               </a:rPr>
               <a:pPr/>
-              <a:t>03-12-2019</a:t>
+              <a:t>04-12-2019</a:t>
             </a:fld>
             <a:endParaRPr lang="en-IN">
               <a:solidFill>
@@ -10394,7 +10393,7 @@
                 </a:solidFill>
               </a:rPr>
               <a:pPr/>
-              <a:t>03-12-2019</a:t>
+              <a:t>04-12-2019</a:t>
             </a:fld>
             <a:endParaRPr lang="en-IN">
               <a:solidFill>
@@ -10520,7 +10519,7 @@
                 </a:solidFill>
               </a:rPr>
               <a:pPr/>
-              <a:t>03-12-2019</a:t>
+              <a:t>04-12-2019</a:t>
             </a:fld>
             <a:endParaRPr lang="en-IN">
               <a:solidFill>
@@ -10839,7 +10838,7 @@
                 </a:solidFill>
               </a:rPr>
               <a:pPr/>
-              <a:t>03-12-2019</a:t>
+              <a:t>04-12-2019</a:t>
             </a:fld>
             <a:endParaRPr lang="en-IN">
               <a:solidFill>
@@ -11143,7 +11142,7 @@
                 </a:solidFill>
               </a:rPr>
               <a:pPr/>
-              <a:t>03-12-2019</a:t>
+              <a:t>04-12-2019</a:t>
             </a:fld>
             <a:endParaRPr lang="en-IN">
               <a:solidFill>
@@ -11349,7 +11348,7 @@
                 </a:solidFill>
               </a:rPr>
               <a:pPr/>
-              <a:t>03-12-2019</a:t>
+              <a:t>04-12-2019</a:t>
             </a:fld>
             <a:endParaRPr lang="en-IN">
               <a:solidFill>
@@ -11560,7 +11559,7 @@
                 </a:solidFill>
               </a:rPr>
               <a:pPr/>
-              <a:t>03-12-2019</a:t>
+              <a:t>04-12-2019</a:t>
             </a:fld>
             <a:endParaRPr lang="en-IN">
               <a:solidFill>
@@ -15719,7 +15718,7 @@
                 </a:solidFill>
               </a:rPr>
               <a:pPr/>
-              <a:t>03-12-2019</a:t>
+              <a:t>04-12-2019</a:t>
             </a:fld>
             <a:endParaRPr lang="en-IN">
               <a:solidFill>
@@ -17968,7 +17967,7 @@
             </a:pPr>
             <a:r>
               <a:rPr lang="en-IN" sz="2100" dirty="0"/>
-              <a:t>Three stages:</a:t>
+              <a:t>Four stages:</a:t>
             </a:r>
           </a:p>
           <a:p>
@@ -17986,14 +17985,21 @@
             <a:pPr lvl="1" algn="just"/>
             <a:r>
               <a:rPr lang="en-IN" sz="2100" dirty="0"/>
-              <a:t>Staging directory</a:t>
+              <a:t>Staging/Index directory</a:t>
             </a:r>
           </a:p>
           <a:p>
             <a:pPr lvl="1" algn="just"/>
             <a:r>
               <a:rPr lang="en-IN" sz="2100" dirty="0"/>
-              <a:t>Git directory (repository)</a:t>
+              <a:t>Local repository</a:t>
+            </a:r>
+          </a:p>
+          <a:p>
+            <a:pPr lvl="1" algn="just"/>
+            <a:r>
+              <a:rPr lang="en-IN" sz="2100" dirty="0"/>
+              <a:t>Remote repository</a:t>
             </a:r>
           </a:p>
         </p:txBody>
@@ -18082,7 +18088,7 @@
           <a:p>
             <a:r>
               <a:rPr lang="en-IN" dirty="0"/>
-              <a:t>Git: Development</a:t>
+              <a:t>Git: Outline</a:t>
             </a:r>
           </a:p>
         </p:txBody>
@@ -18109,53 +18115,16 @@
             </a:pPr>
             <a:r>
               <a:rPr lang="en-IN" sz="2100" dirty="0"/>
-              <a:t>Setup</a:t>
-            </a:r>
-          </a:p>
-          <a:p>
-            <a:pPr lvl="1" algn="just"/>
-            <a:endParaRPr lang="en-IN" sz="2100" dirty="0"/>
-          </a:p>
-          <a:p>
-            <a:pPr lvl="1" algn="just"/>
-            <a:r>
-              <a:rPr lang="en-IN" sz="2100" dirty="0"/>
-              <a:t>git </a:t>
-            </a:r>
-            <a:r>
-              <a:rPr lang="en-IN" sz="2100" dirty="0" err="1"/>
-              <a:t>init</a:t>
-            </a:r>
-            <a:endParaRPr lang="en-IN" sz="2100" dirty="0"/>
-          </a:p>
-          <a:p>
-            <a:pPr lvl="1" algn="just"/>
-            <a:r>
-              <a:rPr lang="en-IN" sz="2100" dirty="0"/>
-              <a:t>git clone &lt;remote-</a:t>
-            </a:r>
-            <a:r>
-              <a:rPr lang="en-IN" sz="2100" dirty="0" err="1"/>
-              <a:t>url</a:t>
-            </a:r>
-            <a:r>
-              <a:rPr lang="en-IN" sz="2100" dirty="0"/>
-              <a:t>&gt;</a:t>
+              <a:t> </a:t>
             </a:r>
           </a:p>
         </p:txBody>
       </p:sp>
       <p:pic>
         <p:nvPicPr>
-          <p:cNvPr id="4" name="Picture 13">
-            <a:extLst>
-              <a:ext uri="{FF2B5EF4-FFF2-40B4-BE49-F238E27FC236}">
-                <a16:creationId xmlns:a16="http://schemas.microsoft.com/office/drawing/2014/main" id="{FDF6D5C0-7196-462D-9170-D250B6A41756}"/>
-              </a:ext>
-            </a:extLst>
-          </p:cNvPr>
+          <p:cNvPr id="1026" name="Picture 2" descr="struct"/>
           <p:cNvPicPr>
-            <a:picLocks noChangeAspect="1"/>
+            <a:picLocks noChangeAspect="1" noChangeArrowheads="1"/>
           </p:cNvPicPr>
           <p:nvPr/>
         </p:nvPicPr>
@@ -18167,10 +18136,57 @@
               </a:ext>
             </a:extLst>
           </a:blip>
+          <a:srcRect/>
           <a:stretch>
             <a:fillRect/>
           </a:stretch>
         </p:blipFill>
+        <p:spPr bwMode="auto">
+          <a:xfrm>
+            <a:off x="3354388" y="401383"/>
+            <a:ext cx="4581525" cy="4333875"/>
+          </a:xfrm>
+          <a:prstGeom prst="rect">
+            <a:avLst/>
+          </a:prstGeom>
+          <a:noFill/>
+          <a:extLst>
+            <a:ext uri="{909E8E84-426E-40DD-AFC4-6F175D3DCCD1}">
+              <a14:hiddenFill xmlns:a14="http://schemas.microsoft.com/office/drawing/2010/main">
+                <a:solidFill>
+                  <a:srgbClr val="FFFFFF"/>
+                </a:solidFill>
+              </a14:hiddenFill>
+            </a:ext>
+          </a:extLst>
+        </p:spPr>
+      </p:pic>
+      <p:pic>
+        <p:nvPicPr>
+          <p:cNvPr id="5" name="Picture 13">
+            <a:extLst>
+              <a:ext uri="{FF2B5EF4-FFF2-40B4-BE49-F238E27FC236}">
+                <a16:creationId xmlns:a16="http://schemas.microsoft.com/office/drawing/2014/main" id="{186723C8-9DF6-435E-9E80-6A4D62471CB4}"/>
+              </a:ext>
+            </a:extLst>
+          </p:cNvPr>
+          <p:cNvPicPr>
+            <a:picLocks noChangeAspect="1"/>
+          </p:cNvPicPr>
+          <p:nvPr/>
+        </p:nvPicPr>
+        <p:blipFill>
+          <a:blip r:embed="rId3">
+            <a:extLst>
+              <a:ext uri="{28A0092B-C50C-407E-A947-70E740481C1C}">
+                <a14:useLocalDpi xmlns:a14="http://schemas.microsoft.com/office/drawing/2010/main" val="0"/>
+              </a:ext>
+            </a:extLst>
+          </a:blip>
+          <a:stretch>
+            <a:fillRect/>
+          </a:stretch>
+        </p:blipFill>
         <p:spPr>
           <a:xfrm>
             <a:off x="130315" y="4638674"/>
@@ -18185,7 +18201,7 @@
     </p:spTree>
     <p:extLst>
       <p:ext uri="{BB962C8B-B14F-4D97-AF65-F5344CB8AC3E}">
-        <p14:creationId xmlns:p14="http://schemas.microsoft.com/office/powerpoint/2010/main" val="776822470"/>
+        <p14:creationId xmlns:p14="http://schemas.microsoft.com/office/powerpoint/2010/main" val="2976217782"/>
       </p:ext>
     </p:extLst>
   </p:cSld>
@@ -18382,9 +18398,28 @@
               <a:buChar char="•"/>
             </a:pPr>
             <a:r>
+              <a:rPr lang="en-US" dirty="0">
+                <a:latin typeface="Nirmala UI" panose="020B0502040204020203" pitchFamily="34" charset="0"/>
+                <a:cs typeface="Nirmala UI" panose="020B0502040204020203" pitchFamily="34" charset="0"/>
+              </a:rPr>
+              <a:t>WSL</a:t>
+            </a:r>
+            <a:r>
               <a:rPr lang="en-US" dirty="0"/>
-              <a:t>URL3:</a:t>
-            </a:r>
+              <a:t>: </a:t>
+            </a:r>
+            <a:r>
+              <a:rPr lang="es-ES" sz="1400" dirty="0">
+                <a:latin typeface="Nirmala UI" panose="020B0502040204020203" pitchFamily="34" charset="0"/>
+                <a:cs typeface="Nirmala UI" panose="020B0502040204020203" pitchFamily="34" charset="0"/>
+                <a:hlinkClick r:id="rId4"/>
+              </a:rPr>
+              <a:t>https://winaero.com/blog/enable-wsl-windows-10-fall-creators-update/</a:t>
+            </a:r>
+            <a:endParaRPr lang="en-US" sz="1400" dirty="0">
+              <a:latin typeface="Nirmala UI" panose="020B0502040204020203" pitchFamily="34" charset="0"/>
+              <a:cs typeface="Nirmala UI" panose="020B0502040204020203" pitchFamily="34" charset="0"/>
+            </a:endParaRPr>
           </a:p>
           <a:p>
             <a:pPr marL="285750" indent="-285750">
@@ -18395,9 +18430,20 @@
               <a:buChar char="•"/>
             </a:pPr>
             <a:r>
-              <a:rPr lang="en-US" dirty="0"/>
-              <a:t>URL4:</a:t>
-            </a:r>
+              <a:rPr lang="en-US" sz="1600" dirty="0" err="1"/>
+              <a:t>MobaXTerm</a:t>
+            </a:r>
+            <a:r>
+              <a:rPr lang="en-US" sz="1400" dirty="0"/>
+              <a:t>: </a:t>
+            </a:r>
+            <a:r>
+              <a:rPr lang="es-ES" sz="1400" dirty="0">
+                <a:hlinkClick r:id="rId5"/>
+              </a:rPr>
+              <a:t>https://mobaxterm.mobatek.net/download.html</a:t>
+            </a:r>
+            <a:endParaRPr lang="es-ES" sz="1400" dirty="0"/>
           </a:p>
           <a:p>
             <a:pPr marL="285750" indent="-285750">
@@ -18409,8 +18455,27 @@
             </a:pPr>
             <a:r>
               <a:rPr lang="en-US" dirty="0"/>
-              <a:t>URL5:</a:t>
-            </a:r>
+              <a:t>g</a:t>
+            </a:r>
+            <a:r>
+              <a:rPr lang="es-ES" dirty="0" err="1"/>
+              <a:t>it-create</a:t>
+            </a:r>
+            <a:r>
+              <a:rPr lang="es-ES" sz="1400" dirty="0"/>
+              <a:t>: </a:t>
+            </a:r>
+            <a:r>
+              <a:rPr lang="es-ES" sz="1400" dirty="0">
+                <a:hlinkClick r:id="rId6"/>
+              </a:rPr>
+              <a:t>https://github.com/shashwatx/git_101/blob/master/scripts/git-create.sh</a:t>
+            </a:r>
+            <a:r>
+              <a:rPr lang="es-ES" sz="1400" dirty="0"/>
+              <a:t> </a:t>
+            </a:r>
+            <a:endParaRPr lang="en-US" sz="1400" dirty="0"/>
           </a:p>
           <a:p>
             <a:pPr marL="285750" indent="-285750">
@@ -18420,7 +18485,17 @@
               <a:buFont typeface="Arial" panose="020B0604020202020204" pitchFamily="34" charset="0"/>
               <a:buChar char="•"/>
             </a:pPr>
-            <a:endParaRPr dirty="0"/>
+            <a:endParaRPr lang="en-US" u="sng" dirty="0"/>
+          </a:p>
+          <a:p>
+            <a:pPr marL="285750" indent="-285750">
+              <a:lnSpc>
+                <a:spcPct val="100000"/>
+              </a:lnSpc>
+              <a:buFont typeface="Arial" panose="020B0604020202020204" pitchFamily="34" charset="0"/>
+              <a:buChar char="•"/>
+            </a:pPr>
+            <a:endParaRPr u="sng" dirty="0"/>
           </a:p>
         </p:txBody>
       </p:sp>
@@ -18439,7 +18514,7 @@
           <p:nvPr/>
         </p:nvPicPr>
         <p:blipFill>
-          <a:blip r:embed="rId4">
+          <a:blip r:embed="rId7">
             <a:extLst>
               <a:ext uri="{28A0092B-C50C-407E-A947-70E740481C1C}">
                 <a14:useLocalDpi xmlns:a14="http://schemas.microsoft.com/office/drawing/2010/main" val="0"/>
@@ -18557,23 +18632,39 @@
             </a:pPr>
             <a:r>
               <a:rPr lang="en-IN" sz="2100" dirty="0"/>
-              <a:t>Check “snapshots” of the codebase</a:t>
+              <a:t>Setup</a:t>
             </a:r>
           </a:p>
           <a:p>
             <a:pPr lvl="1" algn="just"/>
-            <a:endParaRPr lang="en-IN" sz="2100" dirty="0"/>
+            <a:r>
+              <a:rPr lang="en-IN" sz="2100" i="1" dirty="0"/>
+              <a:t>git </a:t>
+            </a:r>
+            <a:r>
+              <a:rPr lang="en-IN" sz="2100" i="1" dirty="0" err="1"/>
+              <a:t>init</a:t>
+            </a:r>
+            <a:endParaRPr lang="en-IN" sz="2100" i="1" dirty="0"/>
           </a:p>
           <a:p>
             <a:pPr lvl="1" algn="just"/>
             <a:r>
-              <a:rPr lang="en-IN" sz="2100" dirty="0"/>
-              <a:t>git log</a:t>
+              <a:rPr lang="en-IN" sz="2100" i="1" dirty="0"/>
+              <a:t>git clone &lt;remote-</a:t>
+            </a:r>
+            <a:r>
+              <a:rPr lang="en-IN" sz="2100" i="1" dirty="0" err="1"/>
+              <a:t>url</a:t>
+            </a:r>
+            <a:r>
+              <a:rPr lang="en-IN" sz="2100" i="1" dirty="0"/>
+              <a:t>&gt;</a:t>
             </a:r>
           </a:p>
           <a:p>
             <a:pPr lvl="1" algn="just"/>
-            <a:endParaRPr lang="en-IN" sz="2100" dirty="0"/>
+            <a:endParaRPr lang="en-IN" sz="2100" i="1" dirty="0"/>
           </a:p>
           <a:p>
             <a:pPr marL="377190" lvl="1" indent="0" algn="just">
@@ -18581,8 +18672,156 @@
             </a:pPr>
             <a:r>
               <a:rPr lang="en-IN" sz="2100" dirty="0"/>
+              <a:t>Save username and password.</a:t>
+            </a:r>
+          </a:p>
+          <a:p>
+            <a:pPr marL="377190" lvl="1" indent="0" algn="just">
+              <a:buNone/>
+            </a:pPr>
+            <a:r>
+              <a:rPr lang="en-IN" sz="2100" i="1" dirty="0"/>
+              <a:t>git config –global </a:t>
+            </a:r>
+            <a:r>
+              <a:rPr lang="en-IN" sz="2100" i="1" dirty="0" err="1"/>
+              <a:t>credential.helper</a:t>
+            </a:r>
+            <a:r>
+              <a:rPr lang="en-IN" sz="2100" i="1" dirty="0"/>
+              <a:t> store</a:t>
+            </a:r>
+          </a:p>
+        </p:txBody>
+      </p:sp>
+      <p:pic>
+        <p:nvPicPr>
+          <p:cNvPr id="4" name="Picture 13">
+            <a:extLst>
+              <a:ext uri="{FF2B5EF4-FFF2-40B4-BE49-F238E27FC236}">
+                <a16:creationId xmlns:a16="http://schemas.microsoft.com/office/drawing/2014/main" id="{FDF6D5C0-7196-462D-9170-D250B6A41756}"/>
+              </a:ext>
+            </a:extLst>
+          </p:cNvPr>
+          <p:cNvPicPr>
+            <a:picLocks noChangeAspect="1"/>
+          </p:cNvPicPr>
+          <p:nvPr/>
+        </p:nvPicPr>
+        <p:blipFill>
+          <a:blip r:embed="rId2">
+            <a:extLst>
+              <a:ext uri="{28A0092B-C50C-407E-A947-70E740481C1C}">
+                <a14:useLocalDpi xmlns:a14="http://schemas.microsoft.com/office/drawing/2010/main" val="0"/>
+              </a:ext>
+            </a:extLst>
+          </a:blip>
+          <a:stretch>
+            <a:fillRect/>
+          </a:stretch>
+        </p:blipFill>
+        <p:spPr>
+          <a:xfrm>
+            <a:off x="130315" y="4638674"/>
+            <a:ext cx="1488935" cy="374933"/>
+          </a:xfrm>
+          <a:prstGeom prst="rect">
+            <a:avLst/>
+          </a:prstGeom>
+          <a:effectLst/>
+        </p:spPr>
+      </p:pic>
+    </p:spTree>
+    <p:extLst>
+      <p:ext uri="{BB962C8B-B14F-4D97-AF65-F5344CB8AC3E}">
+        <p14:creationId xmlns:p14="http://schemas.microsoft.com/office/powerpoint/2010/main" val="776822470"/>
+      </p:ext>
+    </p:extLst>
+  </p:cSld>
+  <p:clrMapOvr>
+    <a:masterClrMapping/>
+  </p:clrMapOvr>
+</p:sld>
+</file>
+
+<file path=ppt/slides/slide21.xml><?xml version="1.0" encoding="utf-8"?>
+<p:sld xmlns:a="http://schemas.openxmlformats.org/drawingml/2006/main" xmlns:r="http://schemas.openxmlformats.org/officeDocument/2006/relationships" xmlns:p="http://schemas.openxmlformats.org/presentationml/2006/main">
+  <p:cSld>
+    <p:spTree>
+      <p:nvGrpSpPr>
+        <p:cNvPr id="1" name=""/>
+        <p:cNvGrpSpPr/>
+        <p:nvPr/>
+      </p:nvGrpSpPr>
+      <p:grpSpPr>
+        <a:xfrm>
+          <a:off x="0" y="0"/>
+          <a:ext cx="0" cy="0"/>
+          <a:chOff x="0" y="0"/>
+          <a:chExt cx="0" cy="0"/>
+        </a:xfrm>
+      </p:grpSpPr>
+      <p:sp>
+        <p:nvSpPr>
+          <p:cNvPr id="2" name="Title 1"/>
+          <p:cNvSpPr>
+            <a:spLocks noGrp="1"/>
+          </p:cNvSpPr>
+          <p:nvPr>
+            <p:ph type="title"/>
+          </p:nvPr>
+        </p:nvSpPr>
+        <p:spPr/>
+        <p:txBody>
+          <a:bodyPr/>
+          <a:lstStyle/>
+          <a:p>
+            <a:r>
+              <a:rPr lang="en-IN" dirty="0"/>
+              <a:t>Git: Development</a:t>
+            </a:r>
+          </a:p>
+        </p:txBody>
+      </p:sp>
+      <p:sp>
+        <p:nvSpPr>
+          <p:cNvPr id="3" name="Content Placeholder 2"/>
+          <p:cNvSpPr>
+            <a:spLocks noGrp="1"/>
+          </p:cNvSpPr>
+          <p:nvPr>
+            <p:ph idx="1"/>
+          </p:nvPr>
+        </p:nvSpPr>
+        <p:spPr/>
+        <p:txBody>
+          <a:bodyPr>
+            <a:normAutofit/>
+          </a:bodyPr>
+          <a:lstStyle/>
+          <a:p>
+            <a:pPr marL="377190" lvl="1" indent="0" algn="just">
+              <a:buNone/>
+            </a:pPr>
+            <a:r>
+              <a:rPr lang="en-IN" sz="2100" dirty="0"/>
               <a:t>Show commit logs</a:t>
             </a:r>
+          </a:p>
+          <a:p>
+            <a:pPr lvl="1" algn="just"/>
+            <a:endParaRPr lang="en-IN" sz="2100" dirty="0"/>
+          </a:p>
+          <a:p>
+            <a:pPr lvl="1" algn="just"/>
+            <a:r>
+              <a:rPr lang="en-IN" sz="2100" i="1" dirty="0"/>
+              <a:t>git log</a:t>
+            </a:r>
+          </a:p>
+          <a:p>
+            <a:pPr lvl="1" algn="just"/>
+            <a:endParaRPr lang="en-IN" sz="2100" dirty="0"/>
           </a:p>
         </p:txBody>
       </p:sp>
@@ -18636,7 +18875,7 @@
 </p:sld>
 </file>
 
-<file path=ppt/slides/slide21.xml><?xml version="1.0" encoding="utf-8"?>
+<file path=ppt/slides/slide22.xml><?xml version="1.0" encoding="utf-8"?>
 <p:sld xmlns:a="http://schemas.openxmlformats.org/drawingml/2006/main" xmlns:r="http://schemas.openxmlformats.org/officeDocument/2006/relationships" xmlns:p="http://schemas.openxmlformats.org/presentationml/2006/main">
   <p:cSld>
     <p:spTree>
@@ -18787,165 +19026,6 @@
 </p:sld>
 </file>
 
-<file path=ppt/slides/slide22.xml><?xml version="1.0" encoding="utf-8"?>
-<p:sld xmlns:a="http://schemas.openxmlformats.org/drawingml/2006/main" xmlns:r="http://schemas.openxmlformats.org/officeDocument/2006/relationships" xmlns:p="http://schemas.openxmlformats.org/presentationml/2006/main">
-  <p:cSld>
-    <p:spTree>
-      <p:nvGrpSpPr>
-        <p:cNvPr id="1" name=""/>
-        <p:cNvGrpSpPr/>
-        <p:nvPr/>
-      </p:nvGrpSpPr>
-      <p:grpSpPr>
-        <a:xfrm>
-          <a:off x="0" y="0"/>
-          <a:ext cx="0" cy="0"/>
-          <a:chOff x="0" y="0"/>
-          <a:chExt cx="0" cy="0"/>
-        </a:xfrm>
-      </p:grpSpPr>
-      <p:sp>
-        <p:nvSpPr>
-          <p:cNvPr id="2" name="Title 1"/>
-          <p:cNvSpPr>
-            <a:spLocks noGrp="1"/>
-          </p:cNvSpPr>
-          <p:nvPr>
-            <p:ph type="title"/>
-          </p:nvPr>
-        </p:nvSpPr>
-        <p:spPr/>
-        <p:txBody>
-          <a:bodyPr/>
-          <a:lstStyle/>
-          <a:p>
-            <a:r>
-              <a:rPr lang="en-IN" dirty="0"/>
-              <a:t>Git: Development</a:t>
-            </a:r>
-          </a:p>
-        </p:txBody>
-      </p:sp>
-      <p:sp>
-        <p:nvSpPr>
-          <p:cNvPr id="3" name="Content Placeholder 2"/>
-          <p:cNvSpPr>
-            <a:spLocks noGrp="1"/>
-          </p:cNvSpPr>
-          <p:nvPr>
-            <p:ph idx="1"/>
-          </p:nvPr>
-        </p:nvSpPr>
-        <p:spPr/>
-        <p:txBody>
-          <a:bodyPr>
-            <a:normAutofit/>
-          </a:bodyPr>
-          <a:lstStyle/>
-          <a:p>
-            <a:pPr marL="377190" lvl="1" indent="0" algn="just">
-              <a:buNone/>
-            </a:pPr>
-            <a:r>
-              <a:rPr lang="en-IN" sz="2100" dirty="0"/>
-              <a:t>Branches</a:t>
-            </a:r>
-          </a:p>
-          <a:p>
-            <a:pPr lvl="1" algn="just"/>
-            <a:r>
-              <a:rPr lang="en-IN" sz="2100" dirty="0"/>
-              <a:t>git checkout –b &lt;branch-name&gt;</a:t>
-            </a:r>
-          </a:p>
-          <a:p>
-            <a:pPr marL="377190" lvl="1" indent="0" algn="just">
-              <a:buNone/>
-            </a:pPr>
-            <a:endParaRPr lang="en-IN" sz="2100" dirty="0"/>
-          </a:p>
-        </p:txBody>
-      </p:sp>
-      <p:pic>
-        <p:nvPicPr>
-          <p:cNvPr id="4" name="Picture 3"/>
-          <p:cNvPicPr>
-            <a:picLocks noChangeAspect="1"/>
-          </p:cNvPicPr>
-          <p:nvPr/>
-        </p:nvPicPr>
-        <p:blipFill>
-          <a:blip r:embed="rId2">
-            <a:extLst>
-              <a:ext uri="{28A0092B-C50C-407E-A947-70E740481C1C}">
-                <a14:useLocalDpi xmlns:a14="http://schemas.microsoft.com/office/drawing/2010/main" val="0"/>
-              </a:ext>
-            </a:extLst>
-          </a:blip>
-          <a:stretch>
-            <a:fillRect/>
-          </a:stretch>
-        </p:blipFill>
-        <p:spPr>
-          <a:xfrm>
-            <a:off x="3331603" y="3074461"/>
-            <a:ext cx="3977157" cy="1414100"/>
-          </a:xfrm>
-          <a:prstGeom prst="rect">
-            <a:avLst/>
-          </a:prstGeom>
-        </p:spPr>
-      </p:pic>
-      <p:pic>
-        <p:nvPicPr>
-          <p:cNvPr id="5" name="Picture 13">
-            <a:extLst>
-              <a:ext uri="{FF2B5EF4-FFF2-40B4-BE49-F238E27FC236}">
-                <a16:creationId xmlns:a16="http://schemas.microsoft.com/office/drawing/2014/main" id="{65CAE2E7-043A-4D35-A869-14E0BAE4680F}"/>
-              </a:ext>
-            </a:extLst>
-          </p:cNvPr>
-          <p:cNvPicPr>
-            <a:picLocks noChangeAspect="1"/>
-          </p:cNvPicPr>
-          <p:nvPr/>
-        </p:nvPicPr>
-        <p:blipFill>
-          <a:blip r:embed="rId3">
-            <a:extLst>
-              <a:ext uri="{28A0092B-C50C-407E-A947-70E740481C1C}">
-                <a14:useLocalDpi xmlns:a14="http://schemas.microsoft.com/office/drawing/2010/main" val="0"/>
-              </a:ext>
-            </a:extLst>
-          </a:blip>
-          <a:stretch>
-            <a:fillRect/>
-          </a:stretch>
-        </p:blipFill>
-        <p:spPr>
-          <a:xfrm>
-            <a:off x="130315" y="4638674"/>
-            <a:ext cx="1488935" cy="374933"/>
-          </a:xfrm>
-          <a:prstGeom prst="rect">
-            <a:avLst/>
-          </a:prstGeom>
-          <a:effectLst/>
-        </p:spPr>
-      </p:pic>
-    </p:spTree>
-    <p:extLst>
-      <p:ext uri="{BB962C8B-B14F-4D97-AF65-F5344CB8AC3E}">
-        <p14:creationId xmlns:p14="http://schemas.microsoft.com/office/powerpoint/2010/main" val="4059086026"/>
-      </p:ext>
-    </p:extLst>
-  </p:cSld>
-  <p:clrMapOvr>
-    <a:masterClrMapping/>
-  </p:clrMapOvr>
-</p:sld>
-</file>
-
 <file path=ppt/slides/slide23.xml><?xml version="1.0" encoding="utf-8"?>
 <p:sld xmlns:a="http://schemas.openxmlformats.org/drawingml/2006/main" xmlns:r="http://schemas.openxmlformats.org/officeDocument/2006/relationships" xmlns:p="http://schemas.openxmlformats.org/presentationml/2006/main">
   <p:cSld>
@@ -19017,7 +19097,7 @@
           <a:p>
             <a:pPr lvl="1" algn="just"/>
             <a:r>
-              <a:rPr lang="en-IN" sz="2100" dirty="0"/>
+              <a:rPr lang="en-IN" sz="2100" i="1" dirty="0"/>
               <a:t>git diff</a:t>
             </a:r>
           </a:p>
@@ -19285,7 +19365,7 @@
             </a:pPr>
             <a:r>
               <a:rPr lang="en-IN" sz="2100" dirty="0"/>
-              <a:t>Update staging area</a:t>
+              <a:t>Add changed files to the index</a:t>
             </a:r>
           </a:p>
           <a:p>
@@ -19295,30 +19375,13 @@
           <a:p>
             <a:pPr lvl="1" algn="just"/>
             <a:r>
-              <a:rPr lang="en-IN" sz="2100" dirty="0"/>
-              <a:t>git add &lt;files&gt;</a:t>
+              <a:rPr lang="en-IN" sz="2100" i="1" dirty="0"/>
+              <a:t>git add -u</a:t>
             </a:r>
           </a:p>
           <a:p>
             <a:pPr lvl="1" algn="just"/>
             <a:endParaRPr lang="en-IN" sz="2100" dirty="0"/>
-          </a:p>
-          <a:p>
-            <a:pPr marL="377190" lvl="1" indent="0" algn="just">
-              <a:buNone/>
-            </a:pPr>
-            <a:r>
-              <a:rPr lang="en-IN" sz="2100" dirty="0"/>
-              <a:t>Add file </a:t>
-            </a:r>
-            <a:r>
-              <a:rPr lang="en-IN" sz="2100" b="1" dirty="0"/>
-              <a:t>contents</a:t>
-            </a:r>
-            <a:r>
-              <a:rPr lang="en-IN" sz="2100" dirty="0"/>
-              <a:t> to the index</a:t>
-            </a:r>
           </a:p>
         </p:txBody>
       </p:sp>
@@ -19431,34 +19494,71 @@
             <a:pPr marL="377190" lvl="1" indent="0" algn="just">
               <a:buNone/>
             </a:pPr>
-            <a:r>
-              <a:rPr lang="en-IN" sz="2100" dirty="0"/>
-              <a:t>Create “snapshots” of your codebase</a:t>
-            </a:r>
-          </a:p>
-          <a:p>
-            <a:pPr lvl="1" algn="just"/>
-            <a:endParaRPr lang="en-IN" sz="2100" dirty="0"/>
-          </a:p>
-          <a:p>
-            <a:pPr lvl="1" algn="just"/>
-            <a:r>
-              <a:rPr lang="en-IN" sz="2100" dirty="0"/>
-              <a:t>git commit</a:t>
-            </a:r>
-          </a:p>
-          <a:p>
-            <a:pPr lvl="1" algn="just"/>
             <a:endParaRPr lang="en-IN" sz="2100" dirty="0"/>
           </a:p>
           <a:p>
             <a:pPr marL="377190" lvl="1" indent="0" algn="just">
               <a:buNone/>
             </a:pPr>
+            <a:endParaRPr lang="en-IN" sz="2100" dirty="0"/>
+          </a:p>
+          <a:p>
+            <a:pPr marL="377190" lvl="1" indent="0" algn="just">
+              <a:buNone/>
+            </a:pPr>
             <a:r>
               <a:rPr lang="en-IN" sz="2100" dirty="0"/>
-              <a:t>Records changes to the repository</a:t>
-            </a:r>
+              <a:t>Create “snapshots” of your codebase</a:t>
+            </a:r>
+          </a:p>
+          <a:p>
+            <a:pPr lvl="1" algn="just"/>
+            <a:endParaRPr lang="en-IN" sz="2100" dirty="0"/>
+          </a:p>
+          <a:p>
+            <a:pPr lvl="1" algn="just"/>
+            <a:r>
+              <a:rPr lang="en-IN" sz="2100" i="1" dirty="0"/>
+              <a:t>git commit</a:t>
+            </a:r>
+          </a:p>
+          <a:p>
+            <a:pPr lvl="1" algn="just"/>
+            <a:endParaRPr lang="en-IN" sz="2100" dirty="0"/>
+          </a:p>
+          <a:p>
+            <a:pPr marL="377190" lvl="1" indent="0" algn="just">
+              <a:buNone/>
+            </a:pPr>
+            <a:r>
+              <a:rPr lang="en-IN" sz="2100" dirty="0"/>
+              <a:t>Push to remote</a:t>
+            </a:r>
+          </a:p>
+          <a:p>
+            <a:pPr marL="377190" lvl="1" indent="0" algn="just">
+              <a:buNone/>
+            </a:pPr>
+            <a:endParaRPr lang="en-IN" sz="2100" dirty="0"/>
+          </a:p>
+          <a:p>
+            <a:pPr lvl="1" algn="just"/>
+            <a:r>
+              <a:rPr lang="en-IN" sz="2100" i="1" dirty="0"/>
+              <a:t>git push origin master</a:t>
+            </a:r>
+          </a:p>
+          <a:p>
+            <a:pPr marL="377190" lvl="1" indent="0" algn="just">
+              <a:buNone/>
+            </a:pPr>
+            <a:endParaRPr lang="en-IN" sz="2100" dirty="0"/>
+          </a:p>
+          <a:p>
+            <a:pPr marL="377190" lvl="1" indent="0" algn="just">
+              <a:buNone/>
+            </a:pPr>
+            <a:endParaRPr lang="en-IN" sz="2100" dirty="0"/>
           </a:p>
           <a:p>
             <a:pPr marL="377190" lvl="1" indent="0" algn="just">
@@ -19579,6 +19679,165 @@
             </a:pPr>
             <a:r>
               <a:rPr lang="en-IN" sz="2100" dirty="0"/>
+              <a:t>Branches</a:t>
+            </a:r>
+          </a:p>
+          <a:p>
+            <a:pPr lvl="1" algn="just"/>
+            <a:r>
+              <a:rPr lang="en-IN" sz="2100" dirty="0"/>
+              <a:t>git checkout –b &lt;branch-name&gt;</a:t>
+            </a:r>
+          </a:p>
+          <a:p>
+            <a:pPr marL="377190" lvl="1" indent="0" algn="just">
+              <a:buNone/>
+            </a:pPr>
+            <a:endParaRPr lang="en-IN" sz="2100" dirty="0"/>
+          </a:p>
+        </p:txBody>
+      </p:sp>
+      <p:pic>
+        <p:nvPicPr>
+          <p:cNvPr id="4" name="Picture 3"/>
+          <p:cNvPicPr>
+            <a:picLocks noChangeAspect="1"/>
+          </p:cNvPicPr>
+          <p:nvPr/>
+        </p:nvPicPr>
+        <p:blipFill>
+          <a:blip r:embed="rId2">
+            <a:extLst>
+              <a:ext uri="{28A0092B-C50C-407E-A947-70E740481C1C}">
+                <a14:useLocalDpi xmlns:a14="http://schemas.microsoft.com/office/drawing/2010/main" val="0"/>
+              </a:ext>
+            </a:extLst>
+          </a:blip>
+          <a:stretch>
+            <a:fillRect/>
+          </a:stretch>
+        </p:blipFill>
+        <p:spPr>
+          <a:xfrm>
+            <a:off x="3331603" y="3074461"/>
+            <a:ext cx="3977157" cy="1414100"/>
+          </a:xfrm>
+          <a:prstGeom prst="rect">
+            <a:avLst/>
+          </a:prstGeom>
+        </p:spPr>
+      </p:pic>
+      <p:pic>
+        <p:nvPicPr>
+          <p:cNvPr id="5" name="Picture 13">
+            <a:extLst>
+              <a:ext uri="{FF2B5EF4-FFF2-40B4-BE49-F238E27FC236}">
+                <a16:creationId xmlns:a16="http://schemas.microsoft.com/office/drawing/2014/main" id="{65CAE2E7-043A-4D35-A869-14E0BAE4680F}"/>
+              </a:ext>
+            </a:extLst>
+          </p:cNvPr>
+          <p:cNvPicPr>
+            <a:picLocks noChangeAspect="1"/>
+          </p:cNvPicPr>
+          <p:nvPr/>
+        </p:nvPicPr>
+        <p:blipFill>
+          <a:blip r:embed="rId3">
+            <a:extLst>
+              <a:ext uri="{28A0092B-C50C-407E-A947-70E740481C1C}">
+                <a14:useLocalDpi xmlns:a14="http://schemas.microsoft.com/office/drawing/2010/main" val="0"/>
+              </a:ext>
+            </a:extLst>
+          </a:blip>
+          <a:stretch>
+            <a:fillRect/>
+          </a:stretch>
+        </p:blipFill>
+        <p:spPr>
+          <a:xfrm>
+            <a:off x="130315" y="4638674"/>
+            <a:ext cx="1488935" cy="374933"/>
+          </a:xfrm>
+          <a:prstGeom prst="rect">
+            <a:avLst/>
+          </a:prstGeom>
+          <a:effectLst/>
+        </p:spPr>
+      </p:pic>
+    </p:spTree>
+    <p:extLst>
+      <p:ext uri="{BB962C8B-B14F-4D97-AF65-F5344CB8AC3E}">
+        <p14:creationId xmlns:p14="http://schemas.microsoft.com/office/powerpoint/2010/main" val="4059086026"/>
+      </p:ext>
+    </p:extLst>
+  </p:cSld>
+  <p:clrMapOvr>
+    <a:masterClrMapping/>
+  </p:clrMapOvr>
+</p:sld>
+</file>
+
+<file path=ppt/slides/slide28.xml><?xml version="1.0" encoding="utf-8"?>
+<p:sld xmlns:a="http://schemas.openxmlformats.org/drawingml/2006/main" xmlns:r="http://schemas.openxmlformats.org/officeDocument/2006/relationships" xmlns:p="http://schemas.openxmlformats.org/presentationml/2006/main">
+  <p:cSld>
+    <p:spTree>
+      <p:nvGrpSpPr>
+        <p:cNvPr id="1" name=""/>
+        <p:cNvGrpSpPr/>
+        <p:nvPr/>
+      </p:nvGrpSpPr>
+      <p:grpSpPr>
+        <a:xfrm>
+          <a:off x="0" y="0"/>
+          <a:ext cx="0" cy="0"/>
+          <a:chOff x="0" y="0"/>
+          <a:chExt cx="0" cy="0"/>
+        </a:xfrm>
+      </p:grpSpPr>
+      <p:sp>
+        <p:nvSpPr>
+          <p:cNvPr id="2" name="Title 1"/>
+          <p:cNvSpPr>
+            <a:spLocks noGrp="1"/>
+          </p:cNvSpPr>
+          <p:nvPr>
+            <p:ph type="title"/>
+          </p:nvPr>
+        </p:nvSpPr>
+        <p:spPr/>
+        <p:txBody>
+          <a:bodyPr/>
+          <a:lstStyle/>
+          <a:p>
+            <a:r>
+              <a:rPr lang="en-IN" dirty="0"/>
+              <a:t>Git: Development</a:t>
+            </a:r>
+          </a:p>
+        </p:txBody>
+      </p:sp>
+      <p:sp>
+        <p:nvSpPr>
+          <p:cNvPr id="3" name="Content Placeholder 2"/>
+          <p:cNvSpPr>
+            <a:spLocks noGrp="1"/>
+          </p:cNvSpPr>
+          <p:nvPr>
+            <p:ph idx="1"/>
+          </p:nvPr>
+        </p:nvSpPr>
+        <p:spPr/>
+        <p:txBody>
+          <a:bodyPr>
+            <a:normAutofit/>
+          </a:bodyPr>
+          <a:lstStyle/>
+          <a:p>
+            <a:pPr marL="377190" lvl="1" indent="0" algn="just">
+              <a:buNone/>
+            </a:pPr>
+            <a:r>
+              <a:rPr lang="en-IN" sz="2100" dirty="0"/>
               <a:t>Merge other branches</a:t>
             </a:r>
           </a:p>
@@ -19685,163 +19944,6 @@
 </p:sld>
 </file>
 
-<file path=ppt/slides/slide28.xml><?xml version="1.0" encoding="utf-8"?>
-<p:sld xmlns:a="http://schemas.openxmlformats.org/drawingml/2006/main" xmlns:r="http://schemas.openxmlformats.org/officeDocument/2006/relationships" xmlns:p="http://schemas.openxmlformats.org/presentationml/2006/main">
-  <p:cSld>
-    <p:spTree>
-      <p:nvGrpSpPr>
-        <p:cNvPr id="1" name=""/>
-        <p:cNvGrpSpPr/>
-        <p:nvPr/>
-      </p:nvGrpSpPr>
-      <p:grpSpPr>
-        <a:xfrm>
-          <a:off x="0" y="0"/>
-          <a:ext cx="0" cy="0"/>
-          <a:chOff x="0" y="0"/>
-          <a:chExt cx="0" cy="0"/>
-        </a:xfrm>
-      </p:grpSpPr>
-      <p:sp>
-        <p:nvSpPr>
-          <p:cNvPr id="2" name="Title 1"/>
-          <p:cNvSpPr>
-            <a:spLocks noGrp="1"/>
-          </p:cNvSpPr>
-          <p:nvPr>
-            <p:ph type="title"/>
-          </p:nvPr>
-        </p:nvSpPr>
-        <p:spPr/>
-        <p:txBody>
-          <a:bodyPr/>
-          <a:lstStyle/>
-          <a:p>
-            <a:r>
-              <a:rPr lang="en-IN" dirty="0"/>
-              <a:t>Git: Development</a:t>
-            </a:r>
-          </a:p>
-        </p:txBody>
-      </p:sp>
-      <p:sp>
-        <p:nvSpPr>
-          <p:cNvPr id="3" name="Content Placeholder 2"/>
-          <p:cNvSpPr>
-            <a:spLocks noGrp="1"/>
-          </p:cNvSpPr>
-          <p:nvPr>
-            <p:ph idx="1"/>
-          </p:nvPr>
-        </p:nvSpPr>
-        <p:spPr/>
-        <p:txBody>
-          <a:bodyPr>
-            <a:normAutofit/>
-          </a:bodyPr>
-          <a:lstStyle/>
-          <a:p>
-            <a:pPr marL="377190" lvl="1" indent="0" algn="just">
-              <a:buNone/>
-            </a:pPr>
-            <a:r>
-              <a:rPr lang="en-IN" sz="2100" dirty="0"/>
-              <a:t> </a:t>
-            </a:r>
-          </a:p>
-        </p:txBody>
-      </p:sp>
-      <p:pic>
-        <p:nvPicPr>
-          <p:cNvPr id="1026" name="Picture 2" descr="struct"/>
-          <p:cNvPicPr>
-            <a:picLocks noChangeAspect="1" noChangeArrowheads="1"/>
-          </p:cNvPicPr>
-          <p:nvPr/>
-        </p:nvPicPr>
-        <p:blipFill>
-          <a:blip r:embed="rId2">
-            <a:extLst>
-              <a:ext uri="{28A0092B-C50C-407E-A947-70E740481C1C}">
-                <a14:useLocalDpi xmlns:a14="http://schemas.microsoft.com/office/drawing/2010/main" val="0"/>
-              </a:ext>
-            </a:extLst>
-          </a:blip>
-          <a:srcRect/>
-          <a:stretch>
-            <a:fillRect/>
-          </a:stretch>
-        </p:blipFill>
-        <p:spPr bwMode="auto">
-          <a:xfrm>
-            <a:off x="3354388" y="401383"/>
-            <a:ext cx="4581525" cy="4333875"/>
-          </a:xfrm>
-          <a:prstGeom prst="rect">
-            <a:avLst/>
-          </a:prstGeom>
-          <a:noFill/>
-          <a:extLst>
-            <a:ext uri="{909E8E84-426E-40DD-AFC4-6F175D3DCCD1}">
-              <a14:hiddenFill xmlns:a14="http://schemas.microsoft.com/office/drawing/2010/main">
-                <a:solidFill>
-                  <a:srgbClr val="FFFFFF"/>
-                </a:solidFill>
-              </a14:hiddenFill>
-            </a:ext>
-          </a:extLst>
-        </p:spPr>
-      </p:pic>
-      <p:pic>
-        <p:nvPicPr>
-          <p:cNvPr id="5" name="Picture 13">
-            <a:extLst>
-              <a:ext uri="{FF2B5EF4-FFF2-40B4-BE49-F238E27FC236}">
-                <a16:creationId xmlns:a16="http://schemas.microsoft.com/office/drawing/2014/main" id="{186723C8-9DF6-435E-9E80-6A4D62471CB4}"/>
-              </a:ext>
-            </a:extLst>
-          </p:cNvPr>
-          <p:cNvPicPr>
-            <a:picLocks noChangeAspect="1"/>
-          </p:cNvPicPr>
-          <p:nvPr/>
-        </p:nvPicPr>
-        <p:blipFill>
-          <a:blip r:embed="rId3">
-            <a:extLst>
-              <a:ext uri="{28A0092B-C50C-407E-A947-70E740481C1C}">
-                <a14:useLocalDpi xmlns:a14="http://schemas.microsoft.com/office/drawing/2010/main" val="0"/>
-              </a:ext>
-            </a:extLst>
-          </a:blip>
-          <a:stretch>
-            <a:fillRect/>
-          </a:stretch>
-        </p:blipFill>
-        <p:spPr>
-          <a:xfrm>
-            <a:off x="130315" y="4638674"/>
-            <a:ext cx="1488935" cy="374933"/>
-          </a:xfrm>
-          <a:prstGeom prst="rect">
-            <a:avLst/>
-          </a:prstGeom>
-          <a:effectLst/>
-        </p:spPr>
-      </p:pic>
-    </p:spTree>
-    <p:extLst>
-      <p:ext uri="{BB962C8B-B14F-4D97-AF65-F5344CB8AC3E}">
-        <p14:creationId xmlns:p14="http://schemas.microsoft.com/office/powerpoint/2010/main" val="2976217782"/>
-      </p:ext>
-    </p:extLst>
-  </p:cSld>
-  <p:clrMapOvr>
-    <a:masterClrMapping/>
-  </p:clrMapOvr>
-</p:sld>
-</file>
-
 <file path=ppt/slides/slide29.xml><?xml version="1.0" encoding="utf-8"?>
 <p:sld xmlns:a="http://schemas.openxmlformats.org/drawingml/2006/main" xmlns:r="http://schemas.openxmlformats.org/officeDocument/2006/relationships" xmlns:p="http://schemas.openxmlformats.org/presentationml/2006/main">
   <p:cSld>
@@ -19876,7 +19978,7 @@
           <a:p>
             <a:r>
               <a:rPr lang="en-IN" dirty="0"/>
-              <a:t>Git: Development</a:t>
+              <a:t>Result?</a:t>
             </a:r>
           </a:p>
         </p:txBody>
@@ -19903,37 +20005,43 @@
             </a:pPr>
             <a:r>
               <a:rPr lang="en-IN" sz="2100" dirty="0"/>
-              <a:t>Applying patches	</a:t>
-            </a:r>
-          </a:p>
-          <a:p>
-            <a:pPr lvl="1" algn="just"/>
-            <a:endParaRPr lang="en-IN" sz="2100" dirty="0"/>
-          </a:p>
-          <a:p>
-            <a:pPr lvl="1" algn="just"/>
-            <a:r>
-              <a:rPr lang="en-IN" sz="2100"/>
-              <a:t>git apply &lt;  </a:t>
-            </a:r>
-            <a:r>
-              <a:rPr lang="en-IN" sz="2100" dirty="0" err="1"/>
-              <a:t>fix.patch</a:t>
-            </a:r>
-            <a:endParaRPr lang="en-IN" sz="2100" dirty="0"/>
-          </a:p>
-          <a:p>
-            <a:pPr lvl="1" algn="just"/>
-            <a:endParaRPr lang="en-IN" sz="2100" dirty="0"/>
+              <a:t>The development process of the Linux kernel is maintained using Git</a:t>
+            </a:r>
           </a:p>
           <a:p>
             <a:pPr marL="377190" lvl="1" indent="0" algn="just">
               <a:buNone/>
             </a:pPr>
+            <a:endParaRPr lang="en-IN" sz="2100" dirty="0"/>
+          </a:p>
+          <a:p>
+            <a:pPr marL="377190" lvl="1" indent="0" algn="just">
+              <a:buNone/>
+            </a:pPr>
             <a:r>
               <a:rPr lang="en-IN" sz="2100" dirty="0"/>
-              <a:t>Applies changes from the patch</a:t>
-            </a:r>
+              <a:t>The Linux kernel development process has:</a:t>
+            </a:r>
+          </a:p>
+          <a:p>
+            <a:pPr lvl="1" algn="just"/>
+            <a:r>
+              <a:rPr lang="en-IN" sz="2100" dirty="0"/>
+              <a:t>Over 2000 individual contributors per year</a:t>
+            </a:r>
+          </a:p>
+          <a:p>
+            <a:pPr lvl="1" algn="just"/>
+            <a:r>
+              <a:rPr lang="en-IN" sz="2100" dirty="0"/>
+              <a:t>Grows by nearly 300,000 lines per year</a:t>
+            </a:r>
+          </a:p>
+          <a:p>
+            <a:pPr marL="377190" lvl="1" indent="0" algn="just">
+              <a:buNone/>
+            </a:pPr>
+            <a:endParaRPr lang="en-IN" sz="2100" dirty="0"/>
           </a:p>
         </p:txBody>
       </p:sp>
@@ -19942,7 +20050,7 @@
           <p:cNvPr id="4" name="Picture 13">
             <a:extLst>
               <a:ext uri="{FF2B5EF4-FFF2-40B4-BE49-F238E27FC236}">
-                <a16:creationId xmlns:a16="http://schemas.microsoft.com/office/drawing/2014/main" id="{CEAEA6CA-13CF-4615-B7F3-335A1AC9A653}"/>
+                <a16:creationId xmlns:a16="http://schemas.microsoft.com/office/drawing/2014/main" id="{4DA35C47-EB3A-433E-B1C9-E1B8A38879E9}"/>
               </a:ext>
             </a:extLst>
           </p:cNvPr>
@@ -19977,7 +20085,7 @@
     </p:spTree>
     <p:extLst>
       <p:ext uri="{BB962C8B-B14F-4D97-AF65-F5344CB8AC3E}">
-        <p14:creationId xmlns:p14="http://schemas.microsoft.com/office/powerpoint/2010/main" val="2371952548"/>
+        <p14:creationId xmlns:p14="http://schemas.microsoft.com/office/powerpoint/2010/main" val="477119105"/>
       </p:ext>
     </p:extLst>
   </p:cSld>
@@ -20075,8 +20183,8 @@
         </p:nvSpPr>
         <p:spPr>
           <a:xfrm>
-            <a:off x="5734050" y="2464995"/>
-            <a:ext cx="3125360" cy="1031040"/>
+            <a:off x="5734049" y="2350695"/>
+            <a:ext cx="3305175" cy="1031040"/>
           </a:xfrm>
           <a:prstGeom prst="rect">
             <a:avLst/>
@@ -20103,7 +20211,7 @@
                 <a:latin typeface="Karla"/>
                 <a:ea typeface="Karla"/>
               </a:rPr>
-              <a:t>How do you share and maintain code ?</a:t>
+              <a:t>How do you maintain and share code ?</a:t>
             </a:r>
             <a:endParaRPr sz="2800" dirty="0"/>
           </a:p>
@@ -20184,157 +20292,6 @@
 <file path=ppt/slides/slide30.xml><?xml version="1.0" encoding="utf-8"?>
 <p:sld xmlns:a="http://schemas.openxmlformats.org/drawingml/2006/main" xmlns:r="http://schemas.openxmlformats.org/officeDocument/2006/relationships" xmlns:p="http://schemas.openxmlformats.org/presentationml/2006/main">
   <p:cSld>
-    <p:spTree>
-      <p:nvGrpSpPr>
-        <p:cNvPr id="1" name=""/>
-        <p:cNvGrpSpPr/>
-        <p:nvPr/>
-      </p:nvGrpSpPr>
-      <p:grpSpPr>
-        <a:xfrm>
-          <a:off x="0" y="0"/>
-          <a:ext cx="0" cy="0"/>
-          <a:chOff x="0" y="0"/>
-          <a:chExt cx="0" cy="0"/>
-        </a:xfrm>
-      </p:grpSpPr>
-      <p:sp>
-        <p:nvSpPr>
-          <p:cNvPr id="2" name="Title 1"/>
-          <p:cNvSpPr>
-            <a:spLocks noGrp="1"/>
-          </p:cNvSpPr>
-          <p:nvPr>
-            <p:ph type="title"/>
-          </p:nvPr>
-        </p:nvSpPr>
-        <p:spPr/>
-        <p:txBody>
-          <a:bodyPr/>
-          <a:lstStyle/>
-          <a:p>
-            <a:r>
-              <a:rPr lang="en-IN" dirty="0"/>
-              <a:t>Result?</a:t>
-            </a:r>
-          </a:p>
-        </p:txBody>
-      </p:sp>
-      <p:sp>
-        <p:nvSpPr>
-          <p:cNvPr id="3" name="Content Placeholder 2"/>
-          <p:cNvSpPr>
-            <a:spLocks noGrp="1"/>
-          </p:cNvSpPr>
-          <p:nvPr>
-            <p:ph idx="1"/>
-          </p:nvPr>
-        </p:nvSpPr>
-        <p:spPr/>
-        <p:txBody>
-          <a:bodyPr>
-            <a:normAutofit/>
-          </a:bodyPr>
-          <a:lstStyle/>
-          <a:p>
-            <a:pPr marL="377190" lvl="1" indent="0" algn="just">
-              <a:buNone/>
-            </a:pPr>
-            <a:r>
-              <a:rPr lang="en-IN" sz="2100" dirty="0"/>
-              <a:t>The development process of the Linux kernel is maintained using Git</a:t>
-            </a:r>
-          </a:p>
-          <a:p>
-            <a:pPr marL="377190" lvl="1" indent="0" algn="just">
-              <a:buNone/>
-            </a:pPr>
-            <a:endParaRPr lang="en-IN" sz="2100" dirty="0"/>
-          </a:p>
-          <a:p>
-            <a:pPr marL="377190" lvl="1" indent="0" algn="just">
-              <a:buNone/>
-            </a:pPr>
-            <a:r>
-              <a:rPr lang="en-IN" sz="2100" dirty="0"/>
-              <a:t>The Linux kernel development process has:</a:t>
-            </a:r>
-          </a:p>
-          <a:p>
-            <a:pPr lvl="1" algn="just"/>
-            <a:r>
-              <a:rPr lang="en-IN" sz="2100" dirty="0"/>
-              <a:t>Over 2000 individual contributors per year</a:t>
-            </a:r>
-          </a:p>
-          <a:p>
-            <a:pPr lvl="1" algn="just"/>
-            <a:r>
-              <a:rPr lang="en-IN" sz="2100" dirty="0"/>
-              <a:t>Grows by nearly 300,000 lines per year</a:t>
-            </a:r>
-          </a:p>
-          <a:p>
-            <a:pPr marL="377190" lvl="1" indent="0" algn="just">
-              <a:buNone/>
-            </a:pPr>
-            <a:endParaRPr lang="en-IN" sz="2100" dirty="0"/>
-          </a:p>
-        </p:txBody>
-      </p:sp>
-      <p:pic>
-        <p:nvPicPr>
-          <p:cNvPr id="4" name="Picture 13">
-            <a:extLst>
-              <a:ext uri="{FF2B5EF4-FFF2-40B4-BE49-F238E27FC236}">
-                <a16:creationId xmlns:a16="http://schemas.microsoft.com/office/drawing/2014/main" id="{4DA35C47-EB3A-433E-B1C9-E1B8A38879E9}"/>
-              </a:ext>
-            </a:extLst>
-          </p:cNvPr>
-          <p:cNvPicPr>
-            <a:picLocks noChangeAspect="1"/>
-          </p:cNvPicPr>
-          <p:nvPr/>
-        </p:nvPicPr>
-        <p:blipFill>
-          <a:blip r:embed="rId2">
-            <a:extLst>
-              <a:ext uri="{28A0092B-C50C-407E-A947-70E740481C1C}">
-                <a14:useLocalDpi xmlns:a14="http://schemas.microsoft.com/office/drawing/2010/main" val="0"/>
-              </a:ext>
-            </a:extLst>
-          </a:blip>
-          <a:stretch>
-            <a:fillRect/>
-          </a:stretch>
-        </p:blipFill>
-        <p:spPr>
-          <a:xfrm>
-            <a:off x="130315" y="4638674"/>
-            <a:ext cx="1488935" cy="374933"/>
-          </a:xfrm>
-          <a:prstGeom prst="rect">
-            <a:avLst/>
-          </a:prstGeom>
-          <a:effectLst/>
-        </p:spPr>
-      </p:pic>
-    </p:spTree>
-    <p:extLst>
-      <p:ext uri="{BB962C8B-B14F-4D97-AF65-F5344CB8AC3E}">
-        <p14:creationId xmlns:p14="http://schemas.microsoft.com/office/powerpoint/2010/main" val="477119105"/>
-      </p:ext>
-    </p:extLst>
-  </p:cSld>
-  <p:clrMapOvr>
-    <a:masterClrMapping/>
-  </p:clrMapOvr>
-</p:sld>
-</file>
-
-<file path=ppt/slides/slide31.xml><?xml version="1.0" encoding="utf-8"?>
-<p:sld xmlns:a="http://schemas.openxmlformats.org/drawingml/2006/main" xmlns:r="http://schemas.openxmlformats.org/officeDocument/2006/relationships" xmlns:p="http://schemas.openxmlformats.org/presentationml/2006/main">
-  <p:cSld>
     <p:bg>
       <p:bgPr>
         <a:solidFill>
@@ -20714,36 +20671,6 @@
                 <a:latin typeface="Montserrat"/>
               </a:rPr>
               <a:t> Almost impossible to maintain if the number of people working in the project is large</a:t>
-            </a:r>
-          </a:p>
-          <a:p>
-            <a:pPr marL="285750" indent="-285750">
-              <a:lnSpc>
-                <a:spcPct val="100000"/>
-              </a:lnSpc>
-              <a:buFontTx/>
-              <a:buChar char="-"/>
-            </a:pPr>
-            <a:endParaRPr lang="en-IN" sz="2000" dirty="0">
-              <a:solidFill>
-                <a:srgbClr val="666666"/>
-              </a:solidFill>
-              <a:latin typeface="Montserrat"/>
-            </a:endParaRPr>
-          </a:p>
-          <a:p>
-            <a:pPr marL="285750" indent="-285750">
-              <a:buFontTx/>
-              <a:buChar char="-"/>
-            </a:pPr>
-            <a:r>
-              <a:rPr lang="en-IN" sz="2000" dirty="0">
-                <a:solidFill>
-                  <a:srgbClr val="666666"/>
-                </a:solidFill>
-                <a:latin typeface="Montserrat"/>
-              </a:rPr>
-              <a:t>Testing new unstable features</a:t>
             </a:r>
           </a:p>
           <a:p>

</xml_diff>

<commit_message>
adding pdf version of ppt
</commit_message>
<xml_diff>
--- a/presentation.pptx
+++ b/presentation.pptx
@@ -18325,8 +18325,8 @@
         </p:nvSpPr>
         <p:spPr>
           <a:xfrm>
-            <a:off x="874781" y="1288800"/>
-            <a:ext cx="6830943" cy="1656000"/>
+            <a:off x="874781" y="1288799"/>
+            <a:ext cx="6830943" cy="1981261"/>
           </a:xfrm>
           <a:prstGeom prst="rect">
             <a:avLst/>
@@ -18335,6 +18335,68 @@
         <p:txBody>
           <a:bodyPr lIns="90000" tIns="45000" rIns="90000" bIns="45000"/>
           <a:lstStyle/>
+          <a:p>
+            <a:pPr marL="285750" indent="-285750">
+              <a:buFont typeface="Arial" panose="020B0604020202020204" pitchFamily="34" charset="0"/>
+              <a:buChar char="•"/>
+            </a:pPr>
+            <a:r>
+              <a:rPr lang="en-US" sz="1600" dirty="0">
+                <a:latin typeface="Nirmala UI" panose="020B0502040204020203" pitchFamily="34" charset="0"/>
+                <a:cs typeface="Nirmala UI" panose="020B0502040204020203" pitchFamily="34" charset="0"/>
+              </a:rPr>
+              <a:t>PPT</a:t>
+            </a:r>
+            <a:r>
+              <a:rPr lang="en-US" dirty="0">
+                <a:latin typeface="Nirmala UI" panose="020B0502040204020203" pitchFamily="34" charset="0"/>
+                <a:cs typeface="Nirmala UI" panose="020B0502040204020203" pitchFamily="34" charset="0"/>
+              </a:rPr>
+              <a:t>: </a:t>
+            </a:r>
+            <a:r>
+              <a:rPr lang="es-ES" sz="1400" dirty="0">
+                <a:hlinkClick r:id="rId2"/>
+              </a:rPr>
+              <a:t>https://github.com/shashwatx/git_101/blob/master/presentation.pptx</a:t>
+            </a:r>
+            <a:endParaRPr lang="en-US" sz="1400" dirty="0">
+              <a:latin typeface="Nirmala UI" panose="020B0502040204020203" pitchFamily="34" charset="0"/>
+              <a:cs typeface="Nirmala UI" panose="020B0502040204020203" pitchFamily="34" charset="0"/>
+            </a:endParaRPr>
+          </a:p>
+          <a:p>
+            <a:pPr marL="285750" indent="-285750">
+              <a:buFont typeface="Arial" panose="020B0604020202020204" pitchFamily="34" charset="0"/>
+              <a:buChar char="•"/>
+            </a:pPr>
+            <a:r>
+              <a:rPr lang="en-US" sz="1600" dirty="0">
+                <a:latin typeface="Nirmala UI" panose="020B0502040204020203" pitchFamily="34" charset="0"/>
+                <a:cs typeface="Nirmala UI" panose="020B0502040204020203" pitchFamily="34" charset="0"/>
+              </a:rPr>
+              <a:t>Babel Git</a:t>
+            </a:r>
+            <a:r>
+              <a:rPr lang="en-US" dirty="0">
+                <a:latin typeface="Nirmala UI" panose="020B0502040204020203" pitchFamily="34" charset="0"/>
+                <a:cs typeface="Nirmala UI" panose="020B0502040204020203" pitchFamily="34" charset="0"/>
+              </a:rPr>
+              <a:t>: </a:t>
+            </a:r>
+            <a:r>
+              <a:rPr lang="es-ES" sz="1400" dirty="0">
+                <a:latin typeface="Nirmala UI" panose="020B0502040204020203" pitchFamily="34" charset="0"/>
+                <a:cs typeface="Nirmala UI" panose="020B0502040204020203" pitchFamily="34" charset="0"/>
+                <a:hlinkClick r:id="rId3"/>
+              </a:rPr>
+              <a:t>https://git.babel.es:4433/</a:t>
+            </a:r>
+            <a:endParaRPr lang="en-US" sz="1400" dirty="0">
+              <a:latin typeface="Nirmala UI" panose="020B0502040204020203" pitchFamily="34" charset="0"/>
+              <a:cs typeface="Nirmala UI" panose="020B0502040204020203" pitchFamily="34" charset="0"/>
+            </a:endParaRPr>
+          </a:p>
           <a:p>
             <a:pPr marL="285750" indent="-285750">
               <a:lnSpc>
@@ -18344,19 +18406,23 @@
               <a:buChar char="•"/>
             </a:pPr>
             <a:r>
-              <a:rPr lang="en-US" dirty="0">
+              <a:rPr lang="en-US" sz="1600" dirty="0">
                 <a:latin typeface="Nirmala UI" panose="020B0502040204020203" pitchFamily="34" charset="0"/>
                 <a:cs typeface="Nirmala UI" panose="020B0502040204020203" pitchFamily="34" charset="0"/>
               </a:rPr>
-              <a:t>Babel Git: </a:t>
+              <a:t>WSL</a:t>
+            </a:r>
+            <a:r>
+              <a:rPr lang="en-US" dirty="0"/>
+              <a:t>: </a:t>
             </a:r>
             <a:r>
               <a:rPr lang="es-ES" sz="1400" dirty="0">
                 <a:latin typeface="Nirmala UI" panose="020B0502040204020203" pitchFamily="34" charset="0"/>
                 <a:cs typeface="Nirmala UI" panose="020B0502040204020203" pitchFamily="34" charset="0"/>
-                <a:hlinkClick r:id="rId2"/>
+                <a:hlinkClick r:id="rId4"/>
               </a:rPr>
-              <a:t>https://git.babel.es:4433/</a:t>
+              <a:t>https://winaero.com/blog/enable-wsl-windows-10-fall-creators-update/</a:t>
             </a:r>
             <a:endParaRPr lang="en-US" sz="1400" dirty="0">
               <a:latin typeface="Nirmala UI" panose="020B0502040204020203" pitchFamily="34" charset="0"/>
@@ -18372,22 +18438,20 @@
               <a:buChar char="•"/>
             </a:pPr>
             <a:r>
-              <a:rPr lang="en-US" dirty="0">
-                <a:latin typeface="Nirmala UI" panose="020B0502040204020203" pitchFamily="34" charset="0"/>
-                <a:cs typeface="Nirmala UI" panose="020B0502040204020203" pitchFamily="34" charset="0"/>
+              <a:rPr lang="en-US" sz="1600" dirty="0" err="1"/>
+              <a:t>MobaXTerm</a:t>
+            </a:r>
+            <a:r>
+              <a:rPr lang="en-US" sz="1400" dirty="0"/>
+              <a:t>: </a:t>
+            </a:r>
+            <a:r>
+              <a:rPr lang="es-ES" sz="1400" dirty="0">
+                <a:hlinkClick r:id="rId5"/>
               </a:rPr>
-              <a:t>PPT: </a:t>
-            </a:r>
-            <a:r>
-              <a:rPr lang="es-ES" sz="1400" dirty="0">
-                <a:hlinkClick r:id="rId3"/>
-              </a:rPr>
-              <a:t>https://github.com/shashwatx/git_101/blob/master/presentation.pptx</a:t>
-            </a:r>
-            <a:endParaRPr lang="en-US" sz="1400" dirty="0">
-              <a:latin typeface="Nirmala UI" panose="020B0502040204020203" pitchFamily="34" charset="0"/>
-              <a:cs typeface="Nirmala UI" panose="020B0502040204020203" pitchFamily="34" charset="0"/>
-            </a:endParaRPr>
+              <a:t>https://mobaxterm.mobatek.net/download.html</a:t>
+            </a:r>
+            <a:endParaRPr lang="es-ES" sz="1400" dirty="0"/>
           </a:p>
           <a:p>
             <a:pPr marL="285750" indent="-285750">
@@ -18398,28 +18462,24 @@
               <a:buChar char="•"/>
             </a:pPr>
             <a:r>
-              <a:rPr lang="en-US" dirty="0">
-                <a:latin typeface="Nirmala UI" panose="020B0502040204020203" pitchFamily="34" charset="0"/>
-                <a:cs typeface="Nirmala UI" panose="020B0502040204020203" pitchFamily="34" charset="0"/>
+              <a:rPr lang="en-US" sz="1600" dirty="0"/>
+              <a:t>g</a:t>
+            </a:r>
+            <a:r>
+              <a:rPr lang="es-ES" sz="1600" dirty="0" err="1"/>
+              <a:t>it-create</a:t>
+            </a:r>
+            <a:r>
+              <a:rPr lang="es-ES" sz="1400" dirty="0"/>
+              <a:t>: </a:t>
+            </a:r>
+            <a:r>
+              <a:rPr lang="es-ES" sz="1400" dirty="0">
+                <a:hlinkClick r:id="rId6"/>
               </a:rPr>
-              <a:t>WSL</a:t>
-            </a:r>
-            <a:r>
-              <a:rPr lang="en-US" dirty="0"/>
-              <a:t>: </a:t>
-            </a:r>
-            <a:r>
-              <a:rPr lang="es-ES" sz="1400" dirty="0">
-                <a:latin typeface="Nirmala UI" panose="020B0502040204020203" pitchFamily="34" charset="0"/>
-                <a:cs typeface="Nirmala UI" panose="020B0502040204020203" pitchFamily="34" charset="0"/>
-                <a:hlinkClick r:id="rId4"/>
-              </a:rPr>
-              <a:t>https://winaero.com/blog/enable-wsl-windows-10-fall-creators-update/</a:t>
-            </a:r>
-            <a:endParaRPr lang="en-US" sz="1400" dirty="0">
-              <a:latin typeface="Nirmala UI" panose="020B0502040204020203" pitchFamily="34" charset="0"/>
-              <a:cs typeface="Nirmala UI" panose="020B0502040204020203" pitchFamily="34" charset="0"/>
-            </a:endParaRPr>
+              <a:t>https://github.com/shashwatx/git_101/blob/master/scripts/git-create.sh</a:t>
+            </a:r>
+            <a:endParaRPr lang="es-ES" sz="1400" dirty="0"/>
           </a:p>
           <a:p>
             <a:pPr marL="285750" indent="-285750">
@@ -18430,36 +18490,12 @@
               <a:buChar char="•"/>
             </a:pPr>
             <a:r>
-              <a:rPr lang="en-US" sz="1600" dirty="0" err="1"/>
-              <a:t>MobaXTerm</a:t>
-            </a:r>
-            <a:r>
-              <a:rPr lang="en-US" sz="1400" dirty="0"/>
-              <a:t>: </a:t>
-            </a:r>
-            <a:r>
-              <a:rPr lang="es-ES" sz="1400" dirty="0">
-                <a:hlinkClick r:id="rId5"/>
-              </a:rPr>
-              <a:t>https://mobaxterm.mobatek.net/download.html</a:t>
-            </a:r>
-            <a:endParaRPr lang="es-ES" sz="1400" dirty="0"/>
-          </a:p>
-          <a:p>
-            <a:pPr marL="285750" indent="-285750">
-              <a:lnSpc>
-                <a:spcPct val="100000"/>
-              </a:lnSpc>
-              <a:buFont typeface="Arial" panose="020B0604020202020204" pitchFamily="34" charset="0"/>
-              <a:buChar char="•"/>
-            </a:pPr>
-            <a:r>
-              <a:rPr lang="en-US" dirty="0"/>
-              <a:t>g</a:t>
-            </a:r>
-            <a:r>
-              <a:rPr lang="es-ES" dirty="0" err="1"/>
-              <a:t>it-create</a:t>
+              <a:rPr lang="es-ES" sz="1600" dirty="0" err="1"/>
+              <a:t>Gitlab</a:t>
+            </a:r>
+            <a:r>
+              <a:rPr lang="es-ES" sz="1600" dirty="0"/>
+              <a:t> Access Token</a:t>
             </a:r>
             <a:r>
               <a:rPr lang="es-ES" sz="1400" dirty="0"/>
@@ -18467,13 +18503,9 @@
             </a:r>
             <a:r>
               <a:rPr lang="es-ES" sz="1400" dirty="0">
-                <a:hlinkClick r:id="rId6"/>
+                <a:hlinkClick r:id="rId7"/>
               </a:rPr>
-              <a:t>https://github.com/shashwatx/git_101/blob/master/scripts/git-create.sh</a:t>
-            </a:r>
-            <a:r>
-              <a:rPr lang="es-ES" sz="1400" dirty="0"/>
-              <a:t> </a:t>
+              <a:t>https://docs.gitlab.com/ee/user/profile/personal_access_tokens.html</a:t>
             </a:r>
             <a:endParaRPr lang="en-US" sz="1400" dirty="0"/>
           </a:p>
@@ -18514,7 +18546,7 @@
           <p:nvPr/>
         </p:nvPicPr>
         <p:blipFill>
-          <a:blip r:embed="rId7">
+          <a:blip r:embed="rId8">
             <a:extLst>
               <a:ext uri="{28A0092B-C50C-407E-A947-70E740481C1C}">
                 <a14:useLocalDpi xmlns:a14="http://schemas.microsoft.com/office/drawing/2010/main" val="0"/>
@@ -20396,7 +20428,7 @@
         </p:nvSpPr>
         <p:spPr>
           <a:xfrm>
-            <a:off x="685800" y="3415503"/>
+            <a:off x="4457700" y="3556080"/>
             <a:ext cx="3042634" cy="1006560"/>
           </a:xfrm>
           <a:prstGeom prst="rect">
@@ -20454,7 +20486,7 @@
         </p:nvSpPr>
         <p:spPr>
           <a:xfrm>
-            <a:off x="3674383" y="3471066"/>
+            <a:off x="-192767" y="3616289"/>
             <a:ext cx="4572000" cy="677108"/>
           </a:xfrm>
           <a:prstGeom prst="rect">

</xml_diff>